<commit_message>
Working on Java assessment 1 15/26 code examples done
</commit_message>
<xml_diff>
--- a/Assessment1_Presentation.pptx
+++ b/Assessment1_Presentation.pptx
@@ -132,6 +132,11 @@
       </a:defRPr>
     </a:lvl9pPr>
   </p:defaultTextStyle>
+  <p:extLst>
+    <p:ext uri="{EFAFB233-063F-42B5-8137-9DF3F51BA10A}">
+      <p15:sldGuideLst xmlns:p15="http://schemas.microsoft.com/office/powerpoint/2012/main"/>
+    </p:ext>
+  </p:extLst>
 </p:presentation>
 </file>
 
@@ -284,7 +289,7 @@
           <a:p>
             <a:fld id="{E278B063-FE2D-4C4A-9A12-E78FB6711786}" type="datetimeFigureOut">
               <a:rPr lang="en-NZ" smtClean="0"/>
-              <a:t>4/04/2023</a:t>
+              <a:t>10/04/2023</a:t>
             </a:fld>
             <a:endParaRPr lang="en-NZ"/>
           </a:p>
@@ -484,7 +489,7 @@
           <a:p>
             <a:fld id="{E278B063-FE2D-4C4A-9A12-E78FB6711786}" type="datetimeFigureOut">
               <a:rPr lang="en-NZ" smtClean="0"/>
-              <a:t>4/04/2023</a:t>
+              <a:t>10/04/2023</a:t>
             </a:fld>
             <a:endParaRPr lang="en-NZ"/>
           </a:p>
@@ -694,7 +699,7 @@
           <a:p>
             <a:fld id="{E278B063-FE2D-4C4A-9A12-E78FB6711786}" type="datetimeFigureOut">
               <a:rPr lang="en-NZ" smtClean="0"/>
-              <a:t>4/04/2023</a:t>
+              <a:t>10/04/2023</a:t>
             </a:fld>
             <a:endParaRPr lang="en-NZ"/>
           </a:p>
@@ -894,7 +899,7 @@
           <a:p>
             <a:fld id="{E278B063-FE2D-4C4A-9A12-E78FB6711786}" type="datetimeFigureOut">
               <a:rPr lang="en-NZ" smtClean="0"/>
-              <a:t>4/04/2023</a:t>
+              <a:t>10/04/2023</a:t>
             </a:fld>
             <a:endParaRPr lang="en-NZ"/>
           </a:p>
@@ -1170,7 +1175,7 @@
           <a:p>
             <a:fld id="{E278B063-FE2D-4C4A-9A12-E78FB6711786}" type="datetimeFigureOut">
               <a:rPr lang="en-NZ" smtClean="0"/>
-              <a:t>4/04/2023</a:t>
+              <a:t>10/04/2023</a:t>
             </a:fld>
             <a:endParaRPr lang="en-NZ"/>
           </a:p>
@@ -1438,7 +1443,7 @@
           <a:p>
             <a:fld id="{E278B063-FE2D-4C4A-9A12-E78FB6711786}" type="datetimeFigureOut">
               <a:rPr lang="en-NZ" smtClean="0"/>
-              <a:t>4/04/2023</a:t>
+              <a:t>10/04/2023</a:t>
             </a:fld>
             <a:endParaRPr lang="en-NZ"/>
           </a:p>
@@ -1853,7 +1858,7 @@
           <a:p>
             <a:fld id="{E278B063-FE2D-4C4A-9A12-E78FB6711786}" type="datetimeFigureOut">
               <a:rPr lang="en-NZ" smtClean="0"/>
-              <a:t>4/04/2023</a:t>
+              <a:t>10/04/2023</a:t>
             </a:fld>
             <a:endParaRPr lang="en-NZ"/>
           </a:p>
@@ -1995,7 +2000,7 @@
           <a:p>
             <a:fld id="{E278B063-FE2D-4C4A-9A12-E78FB6711786}" type="datetimeFigureOut">
               <a:rPr lang="en-NZ" smtClean="0"/>
-              <a:t>4/04/2023</a:t>
+              <a:t>10/04/2023</a:t>
             </a:fld>
             <a:endParaRPr lang="en-NZ"/>
           </a:p>
@@ -2108,7 +2113,7 @@
           <a:p>
             <a:fld id="{E278B063-FE2D-4C4A-9A12-E78FB6711786}" type="datetimeFigureOut">
               <a:rPr lang="en-NZ" smtClean="0"/>
-              <a:t>4/04/2023</a:t>
+              <a:t>10/04/2023</a:t>
             </a:fld>
             <a:endParaRPr lang="en-NZ"/>
           </a:p>
@@ -2421,7 +2426,7 @@
           <a:p>
             <a:fld id="{E278B063-FE2D-4C4A-9A12-E78FB6711786}" type="datetimeFigureOut">
               <a:rPr lang="en-NZ" smtClean="0"/>
-              <a:t>4/04/2023</a:t>
+              <a:t>10/04/2023</a:t>
             </a:fld>
             <a:endParaRPr lang="en-NZ"/>
           </a:p>
@@ -2710,7 +2715,7 @@
           <a:p>
             <a:fld id="{E278B063-FE2D-4C4A-9A12-E78FB6711786}" type="datetimeFigureOut">
               <a:rPr lang="en-NZ" smtClean="0"/>
-              <a:t>4/04/2023</a:t>
+              <a:t>10/04/2023</a:t>
             </a:fld>
             <a:endParaRPr lang="en-NZ"/>
           </a:p>
@@ -2953,7 +2958,7 @@
           <a:p>
             <a:fld id="{E278B063-FE2D-4C4A-9A12-E78FB6711786}" type="datetimeFigureOut">
               <a:rPr lang="en-NZ" smtClean="0"/>
-              <a:t>4/04/2023</a:t>
+              <a:t>10/04/2023</a:t>
             </a:fld>
             <a:endParaRPr lang="en-NZ"/>
           </a:p>
@@ -3484,31 +3489,35 @@
           </a:p>
         </p:txBody>
       </p:sp>
-      <p:sp>
-        <p:nvSpPr>
-          <p:cNvPr id="3" name="Content Placeholder 2">
-            <a:extLst>
-              <a:ext uri="{FF2B5EF4-FFF2-40B4-BE49-F238E27FC236}">
-                <a16:creationId xmlns:a16="http://schemas.microsoft.com/office/drawing/2014/main" id="{710790B0-5E20-ACF5-462B-483AFC40D58F}"/>
-              </a:ext>
-            </a:extLst>
-          </p:cNvPr>
-          <p:cNvSpPr>
-            <a:spLocks noGrp="1"/>
-          </p:cNvSpPr>
+      <p:pic>
+        <p:nvPicPr>
+          <p:cNvPr id="5" name="Content Placeholder 4">
+            <a:extLst>
+              <a:ext uri="{FF2B5EF4-FFF2-40B4-BE49-F238E27FC236}">
+                <a16:creationId xmlns:a16="http://schemas.microsoft.com/office/drawing/2014/main" id="{D33696F0-1921-2B53-8860-C183B1D15C20}"/>
+              </a:ext>
+            </a:extLst>
+          </p:cNvPr>
+          <p:cNvPicPr>
+            <a:picLocks noGrp="1" noChangeAspect="1"/>
+          </p:cNvPicPr>
           <p:nvPr>
             <p:ph idx="1"/>
           </p:nvPr>
-        </p:nvSpPr>
-        <p:spPr/>
-        <p:txBody>
-          <a:bodyPr/>
-          <a:lstStyle/>
-          <a:p>
-            <a:endParaRPr lang="en-NZ"/>
-          </a:p>
-        </p:txBody>
-      </p:sp>
+        </p:nvPicPr>
+        <p:blipFill>
+          <a:blip r:embed="rId2"/>
+          <a:stretch>
+            <a:fillRect/>
+          </a:stretch>
+        </p:blipFill>
+        <p:spPr>
+          <a:xfrm>
+            <a:off x="3298518" y="2231545"/>
+            <a:ext cx="3467584" cy="609685"/>
+          </a:xfrm>
+        </p:spPr>
+      </p:pic>
     </p:spTree>
     <p:extLst>
       <p:ext uri="{BB962C8B-B14F-4D97-AF65-F5344CB8AC3E}">
@@ -3567,31 +3576,65 @@
           </a:p>
         </p:txBody>
       </p:sp>
-      <p:sp>
-        <p:nvSpPr>
-          <p:cNvPr id="3" name="Content Placeholder 2">
-            <a:extLst>
-              <a:ext uri="{FF2B5EF4-FFF2-40B4-BE49-F238E27FC236}">
-                <a16:creationId xmlns:a16="http://schemas.microsoft.com/office/drawing/2014/main" id="{10C77921-AF82-BE92-39A3-7031CC3B4F12}"/>
-              </a:ext>
-            </a:extLst>
-          </p:cNvPr>
-          <p:cNvSpPr>
-            <a:spLocks noGrp="1"/>
-          </p:cNvSpPr>
+      <p:pic>
+        <p:nvPicPr>
+          <p:cNvPr id="5" name="Content Placeholder 4">
+            <a:extLst>
+              <a:ext uri="{FF2B5EF4-FFF2-40B4-BE49-F238E27FC236}">
+                <a16:creationId xmlns:a16="http://schemas.microsoft.com/office/drawing/2014/main" id="{01A45979-BCC1-D262-E6A3-668DC800443F}"/>
+              </a:ext>
+            </a:extLst>
+          </p:cNvPr>
+          <p:cNvPicPr>
+            <a:picLocks noGrp="1" noChangeAspect="1"/>
+          </p:cNvPicPr>
           <p:nvPr>
             <p:ph idx="1"/>
           </p:nvPr>
-        </p:nvSpPr>
-        <p:spPr/>
-        <p:txBody>
-          <a:bodyPr/>
-          <a:lstStyle/>
-          <a:p>
-            <a:endParaRPr lang="en-NZ"/>
-          </a:p>
-        </p:txBody>
-      </p:sp>
+        </p:nvPicPr>
+        <p:blipFill>
+          <a:blip r:embed="rId2"/>
+          <a:stretch>
+            <a:fillRect/>
+          </a:stretch>
+        </p:blipFill>
+        <p:spPr>
+          <a:xfrm>
+            <a:off x="1031834" y="1784720"/>
+            <a:ext cx="5220429" cy="962159"/>
+          </a:xfrm>
+        </p:spPr>
+      </p:pic>
+      <p:pic>
+        <p:nvPicPr>
+          <p:cNvPr id="7" name="Picture 6">
+            <a:extLst>
+              <a:ext uri="{FF2B5EF4-FFF2-40B4-BE49-F238E27FC236}">
+                <a16:creationId xmlns:a16="http://schemas.microsoft.com/office/drawing/2014/main" id="{C62F3210-0C09-213E-1A8F-A5138D96B77D}"/>
+              </a:ext>
+            </a:extLst>
+          </p:cNvPr>
+          <p:cNvPicPr>
+            <a:picLocks noChangeAspect="1"/>
+          </p:cNvPicPr>
+          <p:nvPr/>
+        </p:nvPicPr>
+        <p:blipFill>
+          <a:blip r:embed="rId3"/>
+          <a:stretch>
+            <a:fillRect/>
+          </a:stretch>
+        </p:blipFill>
+        <p:spPr>
+          <a:xfrm>
+            <a:off x="5133840" y="3252763"/>
+            <a:ext cx="1924319" cy="352474"/>
+          </a:xfrm>
+          <a:prstGeom prst="rect">
+            <a:avLst/>
+          </a:prstGeom>
+        </p:spPr>
+      </p:pic>
     </p:spTree>
     <p:extLst>
       <p:ext uri="{BB962C8B-B14F-4D97-AF65-F5344CB8AC3E}">
@@ -3650,31 +3693,66 @@
           </a:p>
         </p:txBody>
       </p:sp>
-      <p:sp>
-        <p:nvSpPr>
-          <p:cNvPr id="3" name="Content Placeholder 2">
-            <a:extLst>
-              <a:ext uri="{FF2B5EF4-FFF2-40B4-BE49-F238E27FC236}">
-                <a16:creationId xmlns:a16="http://schemas.microsoft.com/office/drawing/2014/main" id="{A5C8627B-2629-2992-C492-30C4F855B0DE}"/>
-              </a:ext>
-            </a:extLst>
-          </p:cNvPr>
-          <p:cNvSpPr>
-            <a:spLocks noGrp="1"/>
-          </p:cNvSpPr>
-          <p:nvPr>
-            <p:ph idx="1"/>
-          </p:nvPr>
-        </p:nvSpPr>
-        <p:spPr/>
-        <p:txBody>
-          <a:bodyPr/>
-          <a:lstStyle/>
-          <a:p>
-            <a:endParaRPr lang="en-NZ"/>
-          </a:p>
-        </p:txBody>
-      </p:sp>
+      <p:pic>
+        <p:nvPicPr>
+          <p:cNvPr id="4" name="Content Placeholder 4">
+            <a:extLst>
+              <a:ext uri="{FF2B5EF4-FFF2-40B4-BE49-F238E27FC236}">
+                <a16:creationId xmlns:a16="http://schemas.microsoft.com/office/drawing/2014/main" id="{9D2730FC-F881-8964-EB5B-81F64F2989A0}"/>
+              </a:ext>
+            </a:extLst>
+          </p:cNvPr>
+          <p:cNvPicPr>
+            <a:picLocks noChangeAspect="1"/>
+          </p:cNvPicPr>
+          <p:nvPr/>
+        </p:nvPicPr>
+        <p:blipFill>
+          <a:blip r:embed="rId2"/>
+          <a:stretch>
+            <a:fillRect/>
+          </a:stretch>
+        </p:blipFill>
+        <p:spPr>
+          <a:xfrm>
+            <a:off x="754225" y="1397719"/>
+            <a:ext cx="3681323" cy="2490914"/>
+          </a:xfrm>
+          <a:prstGeom prst="rect">
+            <a:avLst/>
+          </a:prstGeom>
+        </p:spPr>
+      </p:pic>
+      <p:pic>
+        <p:nvPicPr>
+          <p:cNvPr id="5" name="Picture 4">
+            <a:extLst>
+              <a:ext uri="{FF2B5EF4-FFF2-40B4-BE49-F238E27FC236}">
+                <a16:creationId xmlns:a16="http://schemas.microsoft.com/office/drawing/2014/main" id="{A199516B-41CC-BC21-B08B-84C6D7E487F1}"/>
+              </a:ext>
+            </a:extLst>
+          </p:cNvPr>
+          <p:cNvPicPr>
+            <a:picLocks noChangeAspect="1"/>
+          </p:cNvPicPr>
+          <p:nvPr/>
+        </p:nvPicPr>
+        <p:blipFill>
+          <a:blip r:embed="rId3"/>
+          <a:stretch>
+            <a:fillRect/>
+          </a:stretch>
+        </p:blipFill>
+        <p:spPr>
+          <a:xfrm>
+            <a:off x="754225" y="3888633"/>
+            <a:ext cx="6347051" cy="2842201"/>
+          </a:xfrm>
+          <a:prstGeom prst="rect">
+            <a:avLst/>
+          </a:prstGeom>
+        </p:spPr>
+      </p:pic>
     </p:spTree>
     <p:extLst>
       <p:ext uri="{BB962C8B-B14F-4D97-AF65-F5344CB8AC3E}">
@@ -3733,31 +3811,65 @@
           </a:p>
         </p:txBody>
       </p:sp>
-      <p:sp>
-        <p:nvSpPr>
-          <p:cNvPr id="3" name="Content Placeholder 2">
-            <a:extLst>
-              <a:ext uri="{FF2B5EF4-FFF2-40B4-BE49-F238E27FC236}">
-                <a16:creationId xmlns:a16="http://schemas.microsoft.com/office/drawing/2014/main" id="{BCDA4665-0B53-F426-07B3-607A885620D8}"/>
-              </a:ext>
-            </a:extLst>
-          </p:cNvPr>
-          <p:cNvSpPr>
-            <a:spLocks noGrp="1"/>
-          </p:cNvSpPr>
+      <p:pic>
+        <p:nvPicPr>
+          <p:cNvPr id="5" name="Content Placeholder 4">
+            <a:extLst>
+              <a:ext uri="{FF2B5EF4-FFF2-40B4-BE49-F238E27FC236}">
+                <a16:creationId xmlns:a16="http://schemas.microsoft.com/office/drawing/2014/main" id="{62CC1931-E7B6-DFB9-9C5B-1507194E2D02}"/>
+              </a:ext>
+            </a:extLst>
+          </p:cNvPr>
+          <p:cNvPicPr>
+            <a:picLocks noGrp="1" noChangeAspect="1"/>
+          </p:cNvPicPr>
           <p:nvPr>
             <p:ph idx="1"/>
           </p:nvPr>
-        </p:nvSpPr>
-        <p:spPr/>
-        <p:txBody>
-          <a:bodyPr/>
-          <a:lstStyle/>
-          <a:p>
-            <a:endParaRPr lang="en-NZ"/>
-          </a:p>
-        </p:txBody>
-      </p:sp>
+        </p:nvPicPr>
+        <p:blipFill>
+          <a:blip r:embed="rId2"/>
+          <a:stretch>
+            <a:fillRect/>
+          </a:stretch>
+        </p:blipFill>
+        <p:spPr>
+          <a:xfrm>
+            <a:off x="838200" y="1871445"/>
+            <a:ext cx="5229955" cy="3115110"/>
+          </a:xfrm>
+        </p:spPr>
+      </p:pic>
+      <p:pic>
+        <p:nvPicPr>
+          <p:cNvPr id="7" name="Picture 6">
+            <a:extLst>
+              <a:ext uri="{FF2B5EF4-FFF2-40B4-BE49-F238E27FC236}">
+                <a16:creationId xmlns:a16="http://schemas.microsoft.com/office/drawing/2014/main" id="{83ED42D6-8158-DE86-52DF-C78A3F078C65}"/>
+              </a:ext>
+            </a:extLst>
+          </p:cNvPr>
+          <p:cNvPicPr>
+            <a:picLocks noChangeAspect="1"/>
+          </p:cNvPicPr>
+          <p:nvPr/>
+        </p:nvPicPr>
+        <p:blipFill>
+          <a:blip r:embed="rId3"/>
+          <a:stretch>
+            <a:fillRect/>
+          </a:stretch>
+        </p:blipFill>
+        <p:spPr>
+          <a:xfrm>
+            <a:off x="6482146" y="1871445"/>
+            <a:ext cx="1467055" cy="1047896"/>
+          </a:xfrm>
+          <a:prstGeom prst="rect">
+            <a:avLst/>
+          </a:prstGeom>
+        </p:spPr>
+      </p:pic>
     </p:spTree>
     <p:extLst>
       <p:ext uri="{BB962C8B-B14F-4D97-AF65-F5344CB8AC3E}">
@@ -3816,31 +3928,95 @@
           </a:p>
         </p:txBody>
       </p:sp>
-      <p:sp>
-        <p:nvSpPr>
-          <p:cNvPr id="3" name="Content Placeholder 2">
-            <a:extLst>
-              <a:ext uri="{FF2B5EF4-FFF2-40B4-BE49-F238E27FC236}">
-                <a16:creationId xmlns:a16="http://schemas.microsoft.com/office/drawing/2014/main" id="{BBE8C7E7-D5C0-B5A5-1EB7-CEA0F1926BD8}"/>
-              </a:ext>
-            </a:extLst>
-          </p:cNvPr>
-          <p:cNvSpPr>
-            <a:spLocks noGrp="1"/>
-          </p:cNvSpPr>
+      <p:pic>
+        <p:nvPicPr>
+          <p:cNvPr id="9" name="Content Placeholder 8">
+            <a:extLst>
+              <a:ext uri="{FF2B5EF4-FFF2-40B4-BE49-F238E27FC236}">
+                <a16:creationId xmlns:a16="http://schemas.microsoft.com/office/drawing/2014/main" id="{C85A3F22-EFE0-AEFD-4670-33D6C3AE7C6E}"/>
+              </a:ext>
+            </a:extLst>
+          </p:cNvPr>
+          <p:cNvPicPr>
+            <a:picLocks noGrp="1" noChangeAspect="1"/>
+          </p:cNvPicPr>
           <p:nvPr>
             <p:ph idx="1"/>
           </p:nvPr>
-        </p:nvSpPr>
-        <p:spPr/>
-        <p:txBody>
-          <a:bodyPr/>
-          <a:lstStyle/>
-          <a:p>
-            <a:endParaRPr lang="en-NZ"/>
-          </a:p>
-        </p:txBody>
-      </p:sp>
+        </p:nvPicPr>
+        <p:blipFill>
+          <a:blip r:embed="rId2"/>
+          <a:stretch>
+            <a:fillRect/>
+          </a:stretch>
+        </p:blipFill>
+        <p:spPr>
+          <a:xfrm>
+            <a:off x="838200" y="1690688"/>
+            <a:ext cx="3515216" cy="1457528"/>
+          </a:xfrm>
+        </p:spPr>
+      </p:pic>
+      <p:pic>
+        <p:nvPicPr>
+          <p:cNvPr id="11" name="Picture 10">
+            <a:extLst>
+              <a:ext uri="{FF2B5EF4-FFF2-40B4-BE49-F238E27FC236}">
+                <a16:creationId xmlns:a16="http://schemas.microsoft.com/office/drawing/2014/main" id="{E08E27B6-2045-DC77-4E2C-D4493BC27572}"/>
+              </a:ext>
+            </a:extLst>
+          </p:cNvPr>
+          <p:cNvPicPr>
+            <a:picLocks noChangeAspect="1"/>
+          </p:cNvPicPr>
+          <p:nvPr/>
+        </p:nvPicPr>
+        <p:blipFill>
+          <a:blip r:embed="rId3"/>
+          <a:stretch>
+            <a:fillRect/>
+          </a:stretch>
+        </p:blipFill>
+        <p:spPr>
+          <a:xfrm>
+            <a:off x="838200" y="3405673"/>
+            <a:ext cx="4077269" cy="2295845"/>
+          </a:xfrm>
+          <a:prstGeom prst="rect">
+            <a:avLst/>
+          </a:prstGeom>
+        </p:spPr>
+      </p:pic>
+      <p:pic>
+        <p:nvPicPr>
+          <p:cNvPr id="13" name="Picture 12">
+            <a:extLst>
+              <a:ext uri="{FF2B5EF4-FFF2-40B4-BE49-F238E27FC236}">
+                <a16:creationId xmlns:a16="http://schemas.microsoft.com/office/drawing/2014/main" id="{6534D1A4-334B-5FAE-F317-7B9A31A03503}"/>
+              </a:ext>
+            </a:extLst>
+          </p:cNvPr>
+          <p:cNvPicPr>
+            <a:picLocks noChangeAspect="1"/>
+          </p:cNvPicPr>
+          <p:nvPr/>
+        </p:nvPicPr>
+        <p:blipFill>
+          <a:blip r:embed="rId4"/>
+          <a:stretch>
+            <a:fillRect/>
+          </a:stretch>
+        </p:blipFill>
+        <p:spPr>
+          <a:xfrm>
+            <a:off x="5699880" y="2026413"/>
+            <a:ext cx="4953691" cy="3924848"/>
+          </a:xfrm>
+          <a:prstGeom prst="rect">
+            <a:avLst/>
+          </a:prstGeom>
+        </p:spPr>
+      </p:pic>
     </p:spTree>
     <p:extLst>
       <p:ext uri="{BB962C8B-B14F-4D97-AF65-F5344CB8AC3E}">
@@ -3899,31 +4075,35 @@
           </a:p>
         </p:txBody>
       </p:sp>
-      <p:sp>
-        <p:nvSpPr>
-          <p:cNvPr id="3" name="Content Placeholder 2">
-            <a:extLst>
-              <a:ext uri="{FF2B5EF4-FFF2-40B4-BE49-F238E27FC236}">
-                <a16:creationId xmlns:a16="http://schemas.microsoft.com/office/drawing/2014/main" id="{C50E5E28-DB13-68C6-1425-5C1FF7BF64DD}"/>
-              </a:ext>
-            </a:extLst>
-          </p:cNvPr>
-          <p:cNvSpPr>
-            <a:spLocks noGrp="1"/>
-          </p:cNvSpPr>
+      <p:pic>
+        <p:nvPicPr>
+          <p:cNvPr id="5" name="Content Placeholder 4">
+            <a:extLst>
+              <a:ext uri="{FF2B5EF4-FFF2-40B4-BE49-F238E27FC236}">
+                <a16:creationId xmlns:a16="http://schemas.microsoft.com/office/drawing/2014/main" id="{DBB9AD8C-30BB-7CD3-7678-451A688E4BA8}"/>
+              </a:ext>
+            </a:extLst>
+          </p:cNvPr>
+          <p:cNvPicPr>
+            <a:picLocks noGrp="1" noChangeAspect="1"/>
+          </p:cNvPicPr>
           <p:nvPr>
             <p:ph idx="1"/>
           </p:nvPr>
-        </p:nvSpPr>
-        <p:spPr/>
-        <p:txBody>
-          <a:bodyPr/>
-          <a:lstStyle/>
-          <a:p>
-            <a:endParaRPr lang="en-NZ"/>
-          </a:p>
-        </p:txBody>
-      </p:sp>
+        </p:nvPicPr>
+        <p:blipFill>
+          <a:blip r:embed="rId2"/>
+          <a:stretch>
+            <a:fillRect/>
+          </a:stretch>
+        </p:blipFill>
+        <p:spPr>
+          <a:xfrm>
+            <a:off x="2571258" y="2424686"/>
+            <a:ext cx="7049484" cy="3153215"/>
+          </a:xfrm>
+        </p:spPr>
+      </p:pic>
     </p:spTree>
     <p:extLst>
       <p:ext uri="{BB962C8B-B14F-4D97-AF65-F5344CB8AC3E}">
@@ -3982,31 +4162,35 @@
           </a:p>
         </p:txBody>
       </p:sp>
-      <p:sp>
-        <p:nvSpPr>
-          <p:cNvPr id="3" name="Content Placeholder 2">
-            <a:extLst>
-              <a:ext uri="{FF2B5EF4-FFF2-40B4-BE49-F238E27FC236}">
-                <a16:creationId xmlns:a16="http://schemas.microsoft.com/office/drawing/2014/main" id="{F023CC8C-3379-86A9-7A05-34CCEAF4AC92}"/>
-              </a:ext>
-            </a:extLst>
-          </p:cNvPr>
-          <p:cNvSpPr>
-            <a:spLocks noGrp="1"/>
-          </p:cNvSpPr>
+      <p:pic>
+        <p:nvPicPr>
+          <p:cNvPr id="4" name="Content Placeholder 4">
+            <a:extLst>
+              <a:ext uri="{FF2B5EF4-FFF2-40B4-BE49-F238E27FC236}">
+                <a16:creationId xmlns:a16="http://schemas.microsoft.com/office/drawing/2014/main" id="{9E156D7C-FA91-2B82-5F75-081103D649F8}"/>
+              </a:ext>
+            </a:extLst>
+          </p:cNvPr>
+          <p:cNvPicPr>
+            <a:picLocks noGrp="1" noChangeAspect="1"/>
+          </p:cNvPicPr>
           <p:nvPr>
             <p:ph idx="1"/>
           </p:nvPr>
-        </p:nvSpPr>
-        <p:spPr/>
-        <p:txBody>
-          <a:bodyPr/>
-          <a:lstStyle/>
-          <a:p>
-            <a:endParaRPr lang="en-NZ"/>
-          </a:p>
-        </p:txBody>
-      </p:sp>
+        </p:nvPicPr>
+        <p:blipFill>
+          <a:blip r:embed="rId2"/>
+          <a:stretch>
+            <a:fillRect/>
+          </a:stretch>
+        </p:blipFill>
+        <p:spPr>
+          <a:xfrm>
+            <a:off x="4119286" y="2643792"/>
+            <a:ext cx="3953427" cy="2715004"/>
+          </a:xfrm>
+        </p:spPr>
+      </p:pic>
     </p:spTree>
     <p:extLst>
       <p:ext uri="{BB962C8B-B14F-4D97-AF65-F5344CB8AC3E}">
@@ -4148,31 +4332,65 @@
           </a:p>
         </p:txBody>
       </p:sp>
-      <p:sp>
-        <p:nvSpPr>
-          <p:cNvPr id="3" name="Content Placeholder 2">
-            <a:extLst>
-              <a:ext uri="{FF2B5EF4-FFF2-40B4-BE49-F238E27FC236}">
-                <a16:creationId xmlns:a16="http://schemas.microsoft.com/office/drawing/2014/main" id="{0D2B2AD6-6B4B-1511-41D0-8B4245378774}"/>
-              </a:ext>
-            </a:extLst>
-          </p:cNvPr>
-          <p:cNvSpPr>
-            <a:spLocks noGrp="1"/>
-          </p:cNvSpPr>
+      <p:pic>
+        <p:nvPicPr>
+          <p:cNvPr id="5" name="Content Placeholder 4">
+            <a:extLst>
+              <a:ext uri="{FF2B5EF4-FFF2-40B4-BE49-F238E27FC236}">
+                <a16:creationId xmlns:a16="http://schemas.microsoft.com/office/drawing/2014/main" id="{7F905DD6-D22E-57DC-AADC-A4B6D0B7F05E}"/>
+              </a:ext>
+            </a:extLst>
+          </p:cNvPr>
+          <p:cNvPicPr>
+            <a:picLocks noGrp="1" noChangeAspect="1"/>
+          </p:cNvPicPr>
           <p:nvPr>
             <p:ph idx="1"/>
           </p:nvPr>
-        </p:nvSpPr>
-        <p:spPr/>
-        <p:txBody>
-          <a:bodyPr/>
-          <a:lstStyle/>
-          <a:p>
-            <a:endParaRPr lang="en-NZ"/>
-          </a:p>
-        </p:txBody>
-      </p:sp>
+        </p:nvPicPr>
+        <p:blipFill>
+          <a:blip r:embed="rId2"/>
+          <a:stretch>
+            <a:fillRect/>
+          </a:stretch>
+        </p:blipFill>
+        <p:spPr>
+          <a:xfrm>
+            <a:off x="838200" y="1690688"/>
+            <a:ext cx="4839375" cy="2638793"/>
+          </a:xfrm>
+        </p:spPr>
+      </p:pic>
+      <p:pic>
+        <p:nvPicPr>
+          <p:cNvPr id="7" name="Picture 6">
+            <a:extLst>
+              <a:ext uri="{FF2B5EF4-FFF2-40B4-BE49-F238E27FC236}">
+                <a16:creationId xmlns:a16="http://schemas.microsoft.com/office/drawing/2014/main" id="{49B5EAC3-4B7B-F054-1C4C-7020C9A858A2}"/>
+              </a:ext>
+            </a:extLst>
+          </p:cNvPr>
+          <p:cNvPicPr>
+            <a:picLocks noChangeAspect="1"/>
+          </p:cNvPicPr>
+          <p:nvPr/>
+        </p:nvPicPr>
+        <p:blipFill>
+          <a:blip r:embed="rId3"/>
+          <a:stretch>
+            <a:fillRect/>
+          </a:stretch>
+        </p:blipFill>
+        <p:spPr>
+          <a:xfrm>
+            <a:off x="6096000" y="4380799"/>
+            <a:ext cx="4772691" cy="1457528"/>
+          </a:xfrm>
+          <a:prstGeom prst="rect">
+            <a:avLst/>
+          </a:prstGeom>
+        </p:spPr>
+      </p:pic>
     </p:spTree>
     <p:extLst>
       <p:ext uri="{BB962C8B-B14F-4D97-AF65-F5344CB8AC3E}">
@@ -5762,31 +5980,95 @@
           </a:p>
         </p:txBody>
       </p:sp>
-      <p:sp>
-        <p:nvSpPr>
-          <p:cNvPr id="3" name="Content Placeholder 2">
-            <a:extLst>
-              <a:ext uri="{FF2B5EF4-FFF2-40B4-BE49-F238E27FC236}">
-                <a16:creationId xmlns:a16="http://schemas.microsoft.com/office/drawing/2014/main" id="{21853085-7B92-2800-99D7-EBB73BF0E9F7}"/>
-              </a:ext>
-            </a:extLst>
-          </p:cNvPr>
-          <p:cNvSpPr>
-            <a:spLocks noGrp="1"/>
-          </p:cNvSpPr>
+      <p:pic>
+        <p:nvPicPr>
+          <p:cNvPr id="9" name="Content Placeholder 8">
+            <a:extLst>
+              <a:ext uri="{FF2B5EF4-FFF2-40B4-BE49-F238E27FC236}">
+                <a16:creationId xmlns:a16="http://schemas.microsoft.com/office/drawing/2014/main" id="{A156003B-231D-D76F-8270-3B0563A2747F}"/>
+              </a:ext>
+            </a:extLst>
+          </p:cNvPr>
+          <p:cNvPicPr>
+            <a:picLocks noGrp="1" noChangeAspect="1"/>
+          </p:cNvPicPr>
           <p:nvPr>
             <p:ph idx="1"/>
           </p:nvPr>
-        </p:nvSpPr>
-        <p:spPr/>
-        <p:txBody>
-          <a:bodyPr/>
-          <a:lstStyle/>
-          <a:p>
-            <a:endParaRPr lang="en-NZ"/>
-          </a:p>
-        </p:txBody>
-      </p:sp>
+        </p:nvPicPr>
+        <p:blipFill>
+          <a:blip r:embed="rId2"/>
+          <a:stretch>
+            <a:fillRect/>
+          </a:stretch>
+        </p:blipFill>
+        <p:spPr>
+          <a:xfrm>
+            <a:off x="838200" y="1690688"/>
+            <a:ext cx="5191850" cy="1743318"/>
+          </a:xfrm>
+        </p:spPr>
+      </p:pic>
+      <p:pic>
+        <p:nvPicPr>
+          <p:cNvPr id="11" name="Picture 10">
+            <a:extLst>
+              <a:ext uri="{FF2B5EF4-FFF2-40B4-BE49-F238E27FC236}">
+                <a16:creationId xmlns:a16="http://schemas.microsoft.com/office/drawing/2014/main" id="{DC1BD486-42C7-9F95-3689-128D7206A0D7}"/>
+              </a:ext>
+            </a:extLst>
+          </p:cNvPr>
+          <p:cNvPicPr>
+            <a:picLocks noChangeAspect="1"/>
+          </p:cNvPicPr>
+          <p:nvPr/>
+        </p:nvPicPr>
+        <p:blipFill>
+          <a:blip r:embed="rId3"/>
+          <a:stretch>
+            <a:fillRect/>
+          </a:stretch>
+        </p:blipFill>
+        <p:spPr>
+          <a:xfrm>
+            <a:off x="838200" y="3513043"/>
+            <a:ext cx="6239746" cy="1810003"/>
+          </a:xfrm>
+          <a:prstGeom prst="rect">
+            <a:avLst/>
+          </a:prstGeom>
+        </p:spPr>
+      </p:pic>
+      <p:pic>
+        <p:nvPicPr>
+          <p:cNvPr id="13" name="Picture 12">
+            <a:extLst>
+              <a:ext uri="{FF2B5EF4-FFF2-40B4-BE49-F238E27FC236}">
+                <a16:creationId xmlns:a16="http://schemas.microsoft.com/office/drawing/2014/main" id="{4DAE2CA5-95B0-7DB8-7C8D-C08FBB8AF38F}"/>
+              </a:ext>
+            </a:extLst>
+          </p:cNvPr>
+          <p:cNvPicPr>
+            <a:picLocks noChangeAspect="1"/>
+          </p:cNvPicPr>
+          <p:nvPr/>
+        </p:nvPicPr>
+        <p:blipFill>
+          <a:blip r:embed="rId4"/>
+          <a:stretch>
+            <a:fillRect/>
+          </a:stretch>
+        </p:blipFill>
+        <p:spPr>
+          <a:xfrm>
+            <a:off x="6767481" y="1769725"/>
+            <a:ext cx="1848108" cy="971686"/>
+          </a:xfrm>
+          <a:prstGeom prst="rect">
+            <a:avLst/>
+          </a:prstGeom>
+        </p:spPr>
+      </p:pic>
     </p:spTree>
     <p:extLst>
       <p:ext uri="{BB962C8B-B14F-4D97-AF65-F5344CB8AC3E}">
@@ -5845,31 +6127,65 @@
           </a:p>
         </p:txBody>
       </p:sp>
-      <p:sp>
-        <p:nvSpPr>
-          <p:cNvPr id="3" name="Content Placeholder 2">
-            <a:extLst>
-              <a:ext uri="{FF2B5EF4-FFF2-40B4-BE49-F238E27FC236}">
-                <a16:creationId xmlns:a16="http://schemas.microsoft.com/office/drawing/2014/main" id="{6E85B0C3-07EF-450E-E3DD-466D47CA43A6}"/>
-              </a:ext>
-            </a:extLst>
-          </p:cNvPr>
-          <p:cNvSpPr>
-            <a:spLocks noGrp="1"/>
-          </p:cNvSpPr>
+      <p:pic>
+        <p:nvPicPr>
+          <p:cNvPr id="5" name="Content Placeholder 4">
+            <a:extLst>
+              <a:ext uri="{FF2B5EF4-FFF2-40B4-BE49-F238E27FC236}">
+                <a16:creationId xmlns:a16="http://schemas.microsoft.com/office/drawing/2014/main" id="{420E83BE-EE9A-17EA-B100-D52AB1315F82}"/>
+              </a:ext>
+            </a:extLst>
+          </p:cNvPr>
+          <p:cNvPicPr>
+            <a:picLocks noGrp="1" noChangeAspect="1"/>
+          </p:cNvPicPr>
           <p:nvPr>
             <p:ph idx="1"/>
           </p:nvPr>
-        </p:nvSpPr>
-        <p:spPr/>
-        <p:txBody>
-          <a:bodyPr/>
-          <a:lstStyle/>
-          <a:p>
-            <a:endParaRPr lang="en-NZ"/>
-          </a:p>
-        </p:txBody>
-      </p:sp>
+        </p:nvPicPr>
+        <p:blipFill>
+          <a:blip r:embed="rId2"/>
+          <a:stretch>
+            <a:fillRect/>
+          </a:stretch>
+        </p:blipFill>
+        <p:spPr>
+          <a:xfrm>
+            <a:off x="614565" y="1690688"/>
+            <a:ext cx="4058216" cy="2953162"/>
+          </a:xfrm>
+        </p:spPr>
+      </p:pic>
+      <p:pic>
+        <p:nvPicPr>
+          <p:cNvPr id="7" name="Picture 6">
+            <a:extLst>
+              <a:ext uri="{FF2B5EF4-FFF2-40B4-BE49-F238E27FC236}">
+                <a16:creationId xmlns:a16="http://schemas.microsoft.com/office/drawing/2014/main" id="{37BE7545-859B-7FFD-0902-D85A95EAA7E0}"/>
+              </a:ext>
+            </a:extLst>
+          </p:cNvPr>
+          <p:cNvPicPr>
+            <a:picLocks noChangeAspect="1"/>
+          </p:cNvPicPr>
+          <p:nvPr/>
+        </p:nvPicPr>
+        <p:blipFill>
+          <a:blip r:embed="rId3"/>
+          <a:stretch>
+            <a:fillRect/>
+          </a:stretch>
+        </p:blipFill>
+        <p:spPr>
+          <a:xfrm>
+            <a:off x="614565" y="4833890"/>
+            <a:ext cx="5801535" cy="666843"/>
+          </a:xfrm>
+          <a:prstGeom prst="rect">
+            <a:avLst/>
+          </a:prstGeom>
+        </p:spPr>
+      </p:pic>
     </p:spTree>
     <p:extLst>
       <p:ext uri="{BB962C8B-B14F-4D97-AF65-F5344CB8AC3E}">

</xml_diff>

<commit_message>
Working on Java assessment 1 19/26 code examples done
</commit_message>
<xml_diff>
--- a/Assessment1_Presentation.pptx
+++ b/Assessment1_Presentation.pptx
@@ -3397,9 +3397,10 @@
           <a:lstStyle/>
           <a:p>
             <a:r>
-              <a:rPr lang="en-NZ" dirty="0"/>
-              <a:t>10/26</a:t>
-            </a:r>
+              <a:rPr lang="en-NZ"/>
+              <a:t>19/26</a:t>
+            </a:r>
+            <a:endParaRPr lang="en-NZ" dirty="0"/>
           </a:p>
         </p:txBody>
       </p:sp>
@@ -4249,31 +4250,125 @@
           </a:p>
         </p:txBody>
       </p:sp>
-      <p:sp>
-        <p:nvSpPr>
-          <p:cNvPr id="3" name="Content Placeholder 2">
-            <a:extLst>
-              <a:ext uri="{FF2B5EF4-FFF2-40B4-BE49-F238E27FC236}">
-                <a16:creationId xmlns:a16="http://schemas.microsoft.com/office/drawing/2014/main" id="{FA07D456-695E-7FD7-02F9-EECECE1C81F2}"/>
-              </a:ext>
-            </a:extLst>
-          </p:cNvPr>
-          <p:cNvSpPr>
-            <a:spLocks noGrp="1"/>
-          </p:cNvSpPr>
+      <p:pic>
+        <p:nvPicPr>
+          <p:cNvPr id="7" name="Picture 6">
+            <a:extLst>
+              <a:ext uri="{FF2B5EF4-FFF2-40B4-BE49-F238E27FC236}">
+                <a16:creationId xmlns:a16="http://schemas.microsoft.com/office/drawing/2014/main" id="{57BFA67B-BB08-54F5-927C-C5B01A5EC32F}"/>
+              </a:ext>
+            </a:extLst>
+          </p:cNvPr>
+          <p:cNvPicPr>
+            <a:picLocks noChangeAspect="1"/>
+          </p:cNvPicPr>
+          <p:nvPr/>
+        </p:nvPicPr>
+        <p:blipFill>
+          <a:blip r:embed="rId2"/>
+          <a:stretch>
+            <a:fillRect/>
+          </a:stretch>
+        </p:blipFill>
+        <p:spPr>
+          <a:xfrm>
+            <a:off x="4472805" y="1738076"/>
+            <a:ext cx="3600953" cy="3381847"/>
+          </a:xfrm>
+          <a:prstGeom prst="rect">
+            <a:avLst/>
+          </a:prstGeom>
+        </p:spPr>
+      </p:pic>
+      <p:pic>
+        <p:nvPicPr>
+          <p:cNvPr id="11" name="Content Placeholder 10">
+            <a:extLst>
+              <a:ext uri="{FF2B5EF4-FFF2-40B4-BE49-F238E27FC236}">
+                <a16:creationId xmlns:a16="http://schemas.microsoft.com/office/drawing/2014/main" id="{50E62A39-EE03-886D-39C3-7FE5AC004F48}"/>
+              </a:ext>
+            </a:extLst>
+          </p:cNvPr>
+          <p:cNvPicPr>
+            <a:picLocks noGrp="1" noChangeAspect="1"/>
+          </p:cNvPicPr>
           <p:nvPr>
             <p:ph idx="1"/>
           </p:nvPr>
-        </p:nvSpPr>
-        <p:spPr/>
-        <p:txBody>
-          <a:bodyPr/>
-          <a:lstStyle/>
-          <a:p>
-            <a:endParaRPr lang="en-NZ"/>
-          </a:p>
-        </p:txBody>
-      </p:sp>
+        </p:nvPicPr>
+        <p:blipFill>
+          <a:blip r:embed="rId3"/>
+          <a:stretch>
+            <a:fillRect/>
+          </a:stretch>
+        </p:blipFill>
+        <p:spPr>
+          <a:xfrm>
+            <a:off x="643221" y="1740526"/>
+            <a:ext cx="3829584" cy="447737"/>
+          </a:xfrm>
+        </p:spPr>
+      </p:pic>
+      <p:pic>
+        <p:nvPicPr>
+          <p:cNvPr id="13" name="Picture 12">
+            <a:extLst>
+              <a:ext uri="{FF2B5EF4-FFF2-40B4-BE49-F238E27FC236}">
+                <a16:creationId xmlns:a16="http://schemas.microsoft.com/office/drawing/2014/main" id="{930B39AE-CE1A-E6F8-D8F7-0D029A4B438D}"/>
+              </a:ext>
+            </a:extLst>
+          </p:cNvPr>
+          <p:cNvPicPr>
+            <a:picLocks noChangeAspect="1"/>
+          </p:cNvPicPr>
+          <p:nvPr/>
+        </p:nvPicPr>
+        <p:blipFill>
+          <a:blip r:embed="rId4"/>
+          <a:stretch>
+            <a:fillRect/>
+          </a:stretch>
+        </p:blipFill>
+        <p:spPr>
+          <a:xfrm>
+            <a:off x="643221" y="2369618"/>
+            <a:ext cx="3600953" cy="943107"/>
+          </a:xfrm>
+          <a:prstGeom prst="rect">
+            <a:avLst/>
+          </a:prstGeom>
+        </p:spPr>
+      </p:pic>
+      <p:pic>
+        <p:nvPicPr>
+          <p:cNvPr id="15" name="Picture 14">
+            <a:extLst>
+              <a:ext uri="{FF2B5EF4-FFF2-40B4-BE49-F238E27FC236}">
+                <a16:creationId xmlns:a16="http://schemas.microsoft.com/office/drawing/2014/main" id="{FB823E39-A981-0773-5C3A-69A32AAE6558}"/>
+              </a:ext>
+            </a:extLst>
+          </p:cNvPr>
+          <p:cNvPicPr>
+            <a:picLocks noChangeAspect="1"/>
+          </p:cNvPicPr>
+          <p:nvPr/>
+        </p:nvPicPr>
+        <p:blipFill>
+          <a:blip r:embed="rId5"/>
+          <a:stretch>
+            <a:fillRect/>
+          </a:stretch>
+        </p:blipFill>
+        <p:spPr>
+          <a:xfrm>
+            <a:off x="643221" y="3428999"/>
+            <a:ext cx="1648055" cy="619211"/>
+          </a:xfrm>
+          <a:prstGeom prst="rect">
+            <a:avLst/>
+          </a:prstGeom>
+        </p:spPr>
+      </p:pic>
     </p:spTree>
     <p:extLst>
       <p:ext uri="{BB962C8B-B14F-4D97-AF65-F5344CB8AC3E}">
@@ -4678,31 +4773,35 @@
           </a:p>
         </p:txBody>
       </p:sp>
-      <p:sp>
-        <p:nvSpPr>
-          <p:cNvPr id="3" name="Content Placeholder 2">
-            <a:extLst>
-              <a:ext uri="{FF2B5EF4-FFF2-40B4-BE49-F238E27FC236}">
-                <a16:creationId xmlns:a16="http://schemas.microsoft.com/office/drawing/2014/main" id="{515A4D66-CF97-B39E-25A5-491495CD75C9}"/>
-              </a:ext>
-            </a:extLst>
-          </p:cNvPr>
-          <p:cNvSpPr>
-            <a:spLocks noGrp="1"/>
-          </p:cNvSpPr>
+      <p:pic>
+        <p:nvPicPr>
+          <p:cNvPr id="5" name="Content Placeholder 4">
+            <a:extLst>
+              <a:ext uri="{FF2B5EF4-FFF2-40B4-BE49-F238E27FC236}">
+                <a16:creationId xmlns:a16="http://schemas.microsoft.com/office/drawing/2014/main" id="{F35F612C-CD5B-8979-76A6-D7936B656E5F}"/>
+              </a:ext>
+            </a:extLst>
+          </p:cNvPr>
+          <p:cNvPicPr>
+            <a:picLocks noGrp="1" noChangeAspect="1"/>
+          </p:cNvPicPr>
           <p:nvPr>
             <p:ph idx="1"/>
           </p:nvPr>
-        </p:nvSpPr>
-        <p:spPr/>
-        <p:txBody>
-          <a:bodyPr/>
-          <a:lstStyle/>
-          <a:p>
-            <a:endParaRPr lang="en-NZ"/>
-          </a:p>
-        </p:txBody>
-      </p:sp>
+        </p:nvPicPr>
+        <p:blipFill>
+          <a:blip r:embed="rId2"/>
+          <a:stretch>
+            <a:fillRect/>
+          </a:stretch>
+        </p:blipFill>
+        <p:spPr>
+          <a:xfrm>
+            <a:off x="2499810" y="3058187"/>
+            <a:ext cx="7192379" cy="1886213"/>
+          </a:xfrm>
+        </p:spPr>
+      </p:pic>
     </p:spTree>
     <p:extLst>
       <p:ext uri="{BB962C8B-B14F-4D97-AF65-F5344CB8AC3E}">
@@ -4761,31 +4860,35 @@
           </a:p>
         </p:txBody>
       </p:sp>
-      <p:sp>
-        <p:nvSpPr>
-          <p:cNvPr id="3" name="Content Placeholder 2">
-            <a:extLst>
-              <a:ext uri="{FF2B5EF4-FFF2-40B4-BE49-F238E27FC236}">
-                <a16:creationId xmlns:a16="http://schemas.microsoft.com/office/drawing/2014/main" id="{6C0F1940-32AB-BC3B-C848-629C1EF678C5}"/>
-              </a:ext>
-            </a:extLst>
-          </p:cNvPr>
-          <p:cNvSpPr>
-            <a:spLocks noGrp="1"/>
-          </p:cNvSpPr>
+      <p:pic>
+        <p:nvPicPr>
+          <p:cNvPr id="9" name="Content Placeholder 8">
+            <a:extLst>
+              <a:ext uri="{FF2B5EF4-FFF2-40B4-BE49-F238E27FC236}">
+                <a16:creationId xmlns:a16="http://schemas.microsoft.com/office/drawing/2014/main" id="{2A5DDEFA-04C5-690C-831A-D57D031DA317}"/>
+              </a:ext>
+            </a:extLst>
+          </p:cNvPr>
+          <p:cNvPicPr>
+            <a:picLocks noGrp="1" noChangeAspect="1"/>
+          </p:cNvPicPr>
           <p:nvPr>
             <p:ph idx="1"/>
           </p:nvPr>
-        </p:nvSpPr>
-        <p:spPr/>
-        <p:txBody>
-          <a:bodyPr/>
-          <a:lstStyle/>
-          <a:p>
-            <a:endParaRPr lang="en-NZ"/>
-          </a:p>
-        </p:txBody>
-      </p:sp>
+        </p:nvPicPr>
+        <p:blipFill>
+          <a:blip r:embed="rId2"/>
+          <a:stretch>
+            <a:fillRect/>
+          </a:stretch>
+        </p:blipFill>
+        <p:spPr>
+          <a:xfrm>
+            <a:off x="4366971" y="3377319"/>
+            <a:ext cx="3458058" cy="1247949"/>
+          </a:xfrm>
+        </p:spPr>
+      </p:pic>
     </p:spTree>
     <p:extLst>
       <p:ext uri="{BB962C8B-B14F-4D97-AF65-F5344CB8AC3E}">
@@ -4844,31 +4947,65 @@
           </a:p>
         </p:txBody>
       </p:sp>
-      <p:sp>
-        <p:nvSpPr>
-          <p:cNvPr id="3" name="Content Placeholder 2">
-            <a:extLst>
-              <a:ext uri="{FF2B5EF4-FFF2-40B4-BE49-F238E27FC236}">
-                <a16:creationId xmlns:a16="http://schemas.microsoft.com/office/drawing/2014/main" id="{FE275511-7726-6569-9255-85AE64A66A93}"/>
-              </a:ext>
-            </a:extLst>
-          </p:cNvPr>
-          <p:cNvSpPr>
-            <a:spLocks noGrp="1"/>
-          </p:cNvSpPr>
+      <p:pic>
+        <p:nvPicPr>
+          <p:cNvPr id="5" name="Content Placeholder 4">
+            <a:extLst>
+              <a:ext uri="{FF2B5EF4-FFF2-40B4-BE49-F238E27FC236}">
+                <a16:creationId xmlns:a16="http://schemas.microsoft.com/office/drawing/2014/main" id="{86CCABAC-00A5-E483-4746-CE7A345E77F3}"/>
+              </a:ext>
+            </a:extLst>
+          </p:cNvPr>
+          <p:cNvPicPr>
+            <a:picLocks noGrp="1" noChangeAspect="1"/>
+          </p:cNvPicPr>
           <p:nvPr>
             <p:ph idx="1"/>
           </p:nvPr>
-        </p:nvSpPr>
-        <p:spPr/>
-        <p:txBody>
-          <a:bodyPr/>
-          <a:lstStyle/>
-          <a:p>
-            <a:endParaRPr lang="en-NZ"/>
-          </a:p>
-        </p:txBody>
-      </p:sp>
+        </p:nvPicPr>
+        <p:blipFill>
+          <a:blip r:embed="rId2"/>
+          <a:stretch>
+            <a:fillRect/>
+          </a:stretch>
+        </p:blipFill>
+        <p:spPr>
+          <a:xfrm>
+            <a:off x="4400313" y="3186793"/>
+            <a:ext cx="3391373" cy="1629002"/>
+          </a:xfrm>
+        </p:spPr>
+      </p:pic>
+      <p:pic>
+        <p:nvPicPr>
+          <p:cNvPr id="7" name="Picture 6">
+            <a:extLst>
+              <a:ext uri="{FF2B5EF4-FFF2-40B4-BE49-F238E27FC236}">
+                <a16:creationId xmlns:a16="http://schemas.microsoft.com/office/drawing/2014/main" id="{38EE440F-0E52-AF01-36C2-2FBD4032D172}"/>
+              </a:ext>
+            </a:extLst>
+          </p:cNvPr>
+          <p:cNvPicPr>
+            <a:picLocks noChangeAspect="1"/>
+          </p:cNvPicPr>
+          <p:nvPr/>
+        </p:nvPicPr>
+        <p:blipFill>
+          <a:blip r:embed="rId3"/>
+          <a:stretch>
+            <a:fillRect/>
+          </a:stretch>
+        </p:blipFill>
+        <p:spPr>
+          <a:xfrm>
+            <a:off x="5055998" y="4815795"/>
+            <a:ext cx="1781424" cy="562053"/>
+          </a:xfrm>
+          <a:prstGeom prst="rect">
+            <a:avLst/>
+          </a:prstGeom>
+        </p:spPr>
+      </p:pic>
     </p:spTree>
     <p:extLst>
       <p:ext uri="{BB962C8B-B14F-4D97-AF65-F5344CB8AC3E}">
@@ -4927,31 +5064,95 @@
           </a:p>
         </p:txBody>
       </p:sp>
-      <p:sp>
-        <p:nvSpPr>
-          <p:cNvPr id="3" name="Content Placeholder 2">
-            <a:extLst>
-              <a:ext uri="{FF2B5EF4-FFF2-40B4-BE49-F238E27FC236}">
-                <a16:creationId xmlns:a16="http://schemas.microsoft.com/office/drawing/2014/main" id="{6919C531-2804-5F9F-F703-381162BB833A}"/>
-              </a:ext>
-            </a:extLst>
-          </p:cNvPr>
-          <p:cNvSpPr>
-            <a:spLocks noGrp="1"/>
-          </p:cNvSpPr>
+      <p:pic>
+        <p:nvPicPr>
+          <p:cNvPr id="5" name="Content Placeholder 4">
+            <a:extLst>
+              <a:ext uri="{FF2B5EF4-FFF2-40B4-BE49-F238E27FC236}">
+                <a16:creationId xmlns:a16="http://schemas.microsoft.com/office/drawing/2014/main" id="{6229931E-8422-C26C-A654-30579CD0ECD6}"/>
+              </a:ext>
+            </a:extLst>
+          </p:cNvPr>
+          <p:cNvPicPr>
+            <a:picLocks noGrp="1" noChangeAspect="1"/>
+          </p:cNvPicPr>
           <p:nvPr>
             <p:ph idx="1"/>
           </p:nvPr>
-        </p:nvSpPr>
-        <p:spPr/>
-        <p:txBody>
-          <a:bodyPr/>
-          <a:lstStyle/>
-          <a:p>
-            <a:endParaRPr lang="en-NZ"/>
-          </a:p>
-        </p:txBody>
-      </p:sp>
+        </p:nvPicPr>
+        <p:blipFill>
+          <a:blip r:embed="rId2"/>
+          <a:stretch>
+            <a:fillRect/>
+          </a:stretch>
+        </p:blipFill>
+        <p:spPr>
+          <a:xfrm>
+            <a:off x="937288" y="1560005"/>
+            <a:ext cx="4887007" cy="2400635"/>
+          </a:xfrm>
+        </p:spPr>
+      </p:pic>
+      <p:pic>
+        <p:nvPicPr>
+          <p:cNvPr id="7" name="Picture 6">
+            <a:extLst>
+              <a:ext uri="{FF2B5EF4-FFF2-40B4-BE49-F238E27FC236}">
+                <a16:creationId xmlns:a16="http://schemas.microsoft.com/office/drawing/2014/main" id="{1042CEE6-6909-CB35-F114-3F274D5AA58B}"/>
+              </a:ext>
+            </a:extLst>
+          </p:cNvPr>
+          <p:cNvPicPr>
+            <a:picLocks noChangeAspect="1"/>
+          </p:cNvPicPr>
+          <p:nvPr/>
+        </p:nvPicPr>
+        <p:blipFill>
+          <a:blip r:embed="rId3"/>
+          <a:stretch>
+            <a:fillRect/>
+          </a:stretch>
+        </p:blipFill>
+        <p:spPr>
+          <a:xfrm>
+            <a:off x="5923383" y="2760322"/>
+            <a:ext cx="4105848" cy="1276528"/>
+          </a:xfrm>
+          <a:prstGeom prst="rect">
+            <a:avLst/>
+          </a:prstGeom>
+        </p:spPr>
+      </p:pic>
+      <p:pic>
+        <p:nvPicPr>
+          <p:cNvPr id="9" name="Picture 8">
+            <a:extLst>
+              <a:ext uri="{FF2B5EF4-FFF2-40B4-BE49-F238E27FC236}">
+                <a16:creationId xmlns:a16="http://schemas.microsoft.com/office/drawing/2014/main" id="{3BEC2169-0337-25E4-A366-0AD83EEDBD69}"/>
+              </a:ext>
+            </a:extLst>
+          </p:cNvPr>
+          <p:cNvPicPr>
+            <a:picLocks noChangeAspect="1"/>
+          </p:cNvPicPr>
+          <p:nvPr/>
+        </p:nvPicPr>
+        <p:blipFill>
+          <a:blip r:embed="rId4"/>
+          <a:stretch>
+            <a:fillRect/>
+          </a:stretch>
+        </p:blipFill>
+        <p:spPr>
+          <a:xfrm>
+            <a:off x="5923383" y="1560005"/>
+            <a:ext cx="3096057" cy="1114581"/>
+          </a:xfrm>
+          <a:prstGeom prst="rect">
+            <a:avLst/>
+          </a:prstGeom>
+        </p:spPr>
+      </p:pic>
     </p:spTree>
     <p:extLst>
       <p:ext uri="{BB962C8B-B14F-4D97-AF65-F5344CB8AC3E}">

</xml_diff>

<commit_message>
Working on Java assessment 1 24/26 code examples done
</commit_message>
<xml_diff>
--- a/Assessment1_Presentation.pptx
+++ b/Assessment1_Presentation.pptx
@@ -6,34 +6,32 @@
   </p:sldMasterIdLst>
   <p:sldIdLst>
     <p:sldId id="256" r:id="rId2"/>
-    <p:sldId id="257" r:id="rId3"/>
-    <p:sldId id="258" r:id="rId4"/>
-    <p:sldId id="259" r:id="rId5"/>
-    <p:sldId id="260" r:id="rId6"/>
-    <p:sldId id="261" r:id="rId7"/>
-    <p:sldId id="262" r:id="rId8"/>
-    <p:sldId id="263" r:id="rId9"/>
-    <p:sldId id="264" r:id="rId10"/>
-    <p:sldId id="265" r:id="rId11"/>
-    <p:sldId id="266" r:id="rId12"/>
-    <p:sldId id="267" r:id="rId13"/>
-    <p:sldId id="268" r:id="rId14"/>
-    <p:sldId id="269" r:id="rId15"/>
-    <p:sldId id="270" r:id="rId16"/>
-    <p:sldId id="271" r:id="rId17"/>
-    <p:sldId id="272" r:id="rId18"/>
-    <p:sldId id="273" r:id="rId19"/>
-    <p:sldId id="274" r:id="rId20"/>
-    <p:sldId id="275" r:id="rId21"/>
-    <p:sldId id="276" r:id="rId22"/>
-    <p:sldId id="277" r:id="rId23"/>
-    <p:sldId id="278" r:id="rId24"/>
-    <p:sldId id="279" r:id="rId25"/>
-    <p:sldId id="280" r:id="rId26"/>
-    <p:sldId id="281" r:id="rId27"/>
-    <p:sldId id="282" r:id="rId28"/>
-    <p:sldId id="283" r:id="rId29"/>
-    <p:sldId id="284" r:id="rId30"/>
+    <p:sldId id="259" r:id="rId3"/>
+    <p:sldId id="260" r:id="rId4"/>
+    <p:sldId id="261" r:id="rId5"/>
+    <p:sldId id="262" r:id="rId6"/>
+    <p:sldId id="263" r:id="rId7"/>
+    <p:sldId id="264" r:id="rId8"/>
+    <p:sldId id="265" r:id="rId9"/>
+    <p:sldId id="266" r:id="rId10"/>
+    <p:sldId id="267" r:id="rId11"/>
+    <p:sldId id="268" r:id="rId12"/>
+    <p:sldId id="269" r:id="rId13"/>
+    <p:sldId id="270" r:id="rId14"/>
+    <p:sldId id="271" r:id="rId15"/>
+    <p:sldId id="272" r:id="rId16"/>
+    <p:sldId id="273" r:id="rId17"/>
+    <p:sldId id="274" r:id="rId18"/>
+    <p:sldId id="275" r:id="rId19"/>
+    <p:sldId id="276" r:id="rId20"/>
+    <p:sldId id="277" r:id="rId21"/>
+    <p:sldId id="278" r:id="rId22"/>
+    <p:sldId id="279" r:id="rId23"/>
+    <p:sldId id="280" r:id="rId24"/>
+    <p:sldId id="281" r:id="rId25"/>
+    <p:sldId id="282" r:id="rId26"/>
+    <p:sldId id="283" r:id="rId27"/>
+    <p:sldId id="284" r:id="rId28"/>
   </p:sldIdLst>
   <p:sldSz cx="12192000" cy="6858000"/>
   <p:notesSz cx="6858000" cy="9144000"/>
@@ -3397,10 +3395,9 @@
           <a:lstStyle/>
           <a:p>
             <a:r>
-              <a:rPr lang="en-NZ"/>
-              <a:t>19/26</a:t>
-            </a:r>
-            <a:endParaRPr lang="en-NZ" dirty="0"/>
+              <a:rPr lang="en-NZ" dirty="0"/>
+              <a:t>24/26</a:t>
+            </a:r>
           </a:p>
         </p:txBody>
       </p:sp>
@@ -3429,6 +3426,17 @@
               <a:rPr lang="en-NZ" dirty="0"/>
               <a:t>Part A</a:t>
             </a:r>
+          </a:p>
+          <a:p>
+            <a:r>
+              <a:rPr lang="en-NZ" dirty="0"/>
+              <a:t>I’ve </a:t>
+            </a:r>
+            <a:r>
+              <a:rPr lang="en-NZ"/>
+              <a:t>tried this</a:t>
+            </a:r>
+            <a:endParaRPr lang="en-NZ" dirty="0"/>
           </a:p>
         </p:txBody>
       </p:sp>
@@ -3467,7 +3475,7 @@
           <p:cNvPr id="2" name="Title 1">
             <a:extLst>
               <a:ext uri="{FF2B5EF4-FFF2-40B4-BE49-F238E27FC236}">
-                <a16:creationId xmlns:a16="http://schemas.microsoft.com/office/drawing/2014/main" id="{F107DB49-2574-39C9-693D-C8EDBAED35AA}"/>
+                <a16:creationId xmlns:a16="http://schemas.microsoft.com/office/drawing/2014/main" id="{53E9E6D8-47C8-5B86-7C93-6C903F92118B}"/>
               </a:ext>
             </a:extLst>
           </p:cNvPr>
@@ -3485,26 +3493,24 @@
           <a:p>
             <a:r>
               <a:rPr lang="en-NZ" dirty="0"/>
-              <a:t>Static and Final</a:t>
+              <a:t>Method References</a:t>
             </a:r>
           </a:p>
         </p:txBody>
       </p:sp>
       <p:pic>
         <p:nvPicPr>
-          <p:cNvPr id="5" name="Content Placeholder 4">
-            <a:extLst>
-              <a:ext uri="{FF2B5EF4-FFF2-40B4-BE49-F238E27FC236}">
-                <a16:creationId xmlns:a16="http://schemas.microsoft.com/office/drawing/2014/main" id="{D33696F0-1921-2B53-8860-C183B1D15C20}"/>
+          <p:cNvPr id="4" name="Content Placeholder 4">
+            <a:extLst>
+              <a:ext uri="{FF2B5EF4-FFF2-40B4-BE49-F238E27FC236}">
+                <a16:creationId xmlns:a16="http://schemas.microsoft.com/office/drawing/2014/main" id="{9D2730FC-F881-8964-EB5B-81F64F2989A0}"/>
               </a:ext>
             </a:extLst>
           </p:cNvPr>
           <p:cNvPicPr>
-            <a:picLocks noGrp="1" noChangeAspect="1"/>
+            <a:picLocks noChangeAspect="1"/>
           </p:cNvPicPr>
-          <p:nvPr>
-            <p:ph idx="1"/>
-          </p:nvPr>
+          <p:nvPr/>
         </p:nvPicPr>
         <p:blipFill>
           <a:blip r:embed="rId2"/>
@@ -3514,15 +3520,48 @@
         </p:blipFill>
         <p:spPr>
           <a:xfrm>
-            <a:off x="3298518" y="2231545"/>
-            <a:ext cx="3467584" cy="609685"/>
-          </a:xfrm>
+            <a:off x="754225" y="1397719"/>
+            <a:ext cx="3681323" cy="2490914"/>
+          </a:xfrm>
+          <a:prstGeom prst="rect">
+            <a:avLst/>
+          </a:prstGeom>
+        </p:spPr>
+      </p:pic>
+      <p:pic>
+        <p:nvPicPr>
+          <p:cNvPr id="5" name="Picture 4">
+            <a:extLst>
+              <a:ext uri="{FF2B5EF4-FFF2-40B4-BE49-F238E27FC236}">
+                <a16:creationId xmlns:a16="http://schemas.microsoft.com/office/drawing/2014/main" id="{A199516B-41CC-BC21-B08B-84C6D7E487F1}"/>
+              </a:ext>
+            </a:extLst>
+          </p:cNvPr>
+          <p:cNvPicPr>
+            <a:picLocks noChangeAspect="1"/>
+          </p:cNvPicPr>
+          <p:nvPr/>
+        </p:nvPicPr>
+        <p:blipFill>
+          <a:blip r:embed="rId3"/>
+          <a:stretch>
+            <a:fillRect/>
+          </a:stretch>
+        </p:blipFill>
+        <p:spPr>
+          <a:xfrm>
+            <a:off x="754225" y="3888633"/>
+            <a:ext cx="6347051" cy="2842201"/>
+          </a:xfrm>
+          <a:prstGeom prst="rect">
+            <a:avLst/>
+          </a:prstGeom>
         </p:spPr>
       </p:pic>
     </p:spTree>
     <p:extLst>
       <p:ext uri="{BB962C8B-B14F-4D97-AF65-F5344CB8AC3E}">
-        <p14:creationId xmlns:p14="http://schemas.microsoft.com/office/powerpoint/2010/main" val="3477456064"/>
+        <p14:creationId xmlns:p14="http://schemas.microsoft.com/office/powerpoint/2010/main" val="158133589"/>
       </p:ext>
     </p:extLst>
   </p:cSld>
@@ -3554,7 +3593,7 @@
           <p:cNvPr id="2" name="Title 1">
             <a:extLst>
               <a:ext uri="{FF2B5EF4-FFF2-40B4-BE49-F238E27FC236}">
-                <a16:creationId xmlns:a16="http://schemas.microsoft.com/office/drawing/2014/main" id="{DA4D7F7E-2844-6686-FA66-9D071D061FA3}"/>
+                <a16:creationId xmlns:a16="http://schemas.microsoft.com/office/drawing/2014/main" id="{04666C4E-EB66-01BB-5DD4-739B99A1F556}"/>
               </a:ext>
             </a:extLst>
           </p:cNvPr>
@@ -3572,7 +3611,7 @@
           <a:p>
             <a:r>
               <a:rPr lang="en-NZ" dirty="0"/>
-              <a:t>Lambda Expression</a:t>
+              <a:t>List</a:t>
             </a:r>
           </a:p>
         </p:txBody>
@@ -3582,7 +3621,7 @@
           <p:cNvPr id="5" name="Content Placeholder 4">
             <a:extLst>
               <a:ext uri="{FF2B5EF4-FFF2-40B4-BE49-F238E27FC236}">
-                <a16:creationId xmlns:a16="http://schemas.microsoft.com/office/drawing/2014/main" id="{01A45979-BCC1-D262-E6A3-668DC800443F}"/>
+                <a16:creationId xmlns:a16="http://schemas.microsoft.com/office/drawing/2014/main" id="{62CC1931-E7B6-DFB9-9C5B-1507194E2D02}"/>
               </a:ext>
             </a:extLst>
           </p:cNvPr>
@@ -3601,8 +3640,8 @@
         </p:blipFill>
         <p:spPr>
           <a:xfrm>
-            <a:off x="1031834" y="1784720"/>
-            <a:ext cx="5220429" cy="962159"/>
+            <a:off x="838200" y="1871445"/>
+            <a:ext cx="5229955" cy="3115110"/>
           </a:xfrm>
         </p:spPr>
       </p:pic>
@@ -3611,7 +3650,7 @@
           <p:cNvPr id="7" name="Picture 6">
             <a:extLst>
               <a:ext uri="{FF2B5EF4-FFF2-40B4-BE49-F238E27FC236}">
-                <a16:creationId xmlns:a16="http://schemas.microsoft.com/office/drawing/2014/main" id="{C62F3210-0C09-213E-1A8F-A5138D96B77D}"/>
+                <a16:creationId xmlns:a16="http://schemas.microsoft.com/office/drawing/2014/main" id="{83ED42D6-8158-DE86-52DF-C78A3F078C65}"/>
               </a:ext>
             </a:extLst>
           </p:cNvPr>
@@ -3628,8 +3667,8 @@
         </p:blipFill>
         <p:spPr>
           <a:xfrm>
-            <a:off x="5133840" y="3252763"/>
-            <a:ext cx="1924319" cy="352474"/>
+            <a:off x="6482146" y="1871445"/>
+            <a:ext cx="1467055" cy="1047896"/>
           </a:xfrm>
           <a:prstGeom prst="rect">
             <a:avLst/>
@@ -3639,7 +3678,7 @@
     </p:spTree>
     <p:extLst>
       <p:ext uri="{BB962C8B-B14F-4D97-AF65-F5344CB8AC3E}">
-        <p14:creationId xmlns:p14="http://schemas.microsoft.com/office/powerpoint/2010/main" val="4046120223"/>
+        <p14:creationId xmlns:p14="http://schemas.microsoft.com/office/powerpoint/2010/main" val="3364883962"/>
       </p:ext>
     </p:extLst>
   </p:cSld>
@@ -3671,7 +3710,7 @@
           <p:cNvPr id="2" name="Title 1">
             <a:extLst>
               <a:ext uri="{FF2B5EF4-FFF2-40B4-BE49-F238E27FC236}">
-                <a16:creationId xmlns:a16="http://schemas.microsoft.com/office/drawing/2014/main" id="{53E9E6D8-47C8-5B86-7C93-6C903F92118B}"/>
+                <a16:creationId xmlns:a16="http://schemas.microsoft.com/office/drawing/2014/main" id="{EF743613-2113-E28A-8621-060C5816AFA0}"/>
               </a:ext>
             </a:extLst>
           </p:cNvPr>
@@ -3689,24 +3728,26 @@
           <a:p>
             <a:r>
               <a:rPr lang="en-NZ" dirty="0"/>
-              <a:t>Method References</a:t>
+              <a:t>Enum Types</a:t>
             </a:r>
           </a:p>
         </p:txBody>
       </p:sp>
       <p:pic>
         <p:nvPicPr>
-          <p:cNvPr id="4" name="Content Placeholder 4">
-            <a:extLst>
-              <a:ext uri="{FF2B5EF4-FFF2-40B4-BE49-F238E27FC236}">
-                <a16:creationId xmlns:a16="http://schemas.microsoft.com/office/drawing/2014/main" id="{9D2730FC-F881-8964-EB5B-81F64F2989A0}"/>
+          <p:cNvPr id="9" name="Content Placeholder 8">
+            <a:extLst>
+              <a:ext uri="{FF2B5EF4-FFF2-40B4-BE49-F238E27FC236}">
+                <a16:creationId xmlns:a16="http://schemas.microsoft.com/office/drawing/2014/main" id="{C85A3F22-EFE0-AEFD-4670-33D6C3AE7C6E}"/>
               </a:ext>
             </a:extLst>
           </p:cNvPr>
           <p:cNvPicPr>
-            <a:picLocks noChangeAspect="1"/>
+            <a:picLocks noGrp="1" noChangeAspect="1"/>
           </p:cNvPicPr>
-          <p:nvPr/>
+          <p:nvPr>
+            <p:ph idx="1"/>
+          </p:nvPr>
         </p:nvPicPr>
         <p:blipFill>
           <a:blip r:embed="rId2"/>
@@ -3716,20 +3757,17 @@
         </p:blipFill>
         <p:spPr>
           <a:xfrm>
-            <a:off x="754225" y="1397719"/>
-            <a:ext cx="3681323" cy="2490914"/>
-          </a:xfrm>
-          <a:prstGeom prst="rect">
-            <a:avLst/>
-          </a:prstGeom>
+            <a:off x="838200" y="1690688"/>
+            <a:ext cx="3515216" cy="1457528"/>
+          </a:xfrm>
         </p:spPr>
       </p:pic>
       <p:pic>
         <p:nvPicPr>
-          <p:cNvPr id="5" name="Picture 4">
-            <a:extLst>
-              <a:ext uri="{FF2B5EF4-FFF2-40B4-BE49-F238E27FC236}">
-                <a16:creationId xmlns:a16="http://schemas.microsoft.com/office/drawing/2014/main" id="{A199516B-41CC-BC21-B08B-84C6D7E487F1}"/>
+          <p:cNvPr id="11" name="Picture 10">
+            <a:extLst>
+              <a:ext uri="{FF2B5EF4-FFF2-40B4-BE49-F238E27FC236}">
+                <a16:creationId xmlns:a16="http://schemas.microsoft.com/office/drawing/2014/main" id="{E08E27B6-2045-DC77-4E2C-D4493BC27572}"/>
               </a:ext>
             </a:extLst>
           </p:cNvPr>
@@ -3746,8 +3784,38 @@
         </p:blipFill>
         <p:spPr>
           <a:xfrm>
-            <a:off x="754225" y="3888633"/>
-            <a:ext cx="6347051" cy="2842201"/>
+            <a:off x="838200" y="3405673"/>
+            <a:ext cx="4077269" cy="2295845"/>
+          </a:xfrm>
+          <a:prstGeom prst="rect">
+            <a:avLst/>
+          </a:prstGeom>
+        </p:spPr>
+      </p:pic>
+      <p:pic>
+        <p:nvPicPr>
+          <p:cNvPr id="13" name="Picture 12">
+            <a:extLst>
+              <a:ext uri="{FF2B5EF4-FFF2-40B4-BE49-F238E27FC236}">
+                <a16:creationId xmlns:a16="http://schemas.microsoft.com/office/drawing/2014/main" id="{6534D1A4-334B-5FAE-F317-7B9A31A03503}"/>
+              </a:ext>
+            </a:extLst>
+          </p:cNvPr>
+          <p:cNvPicPr>
+            <a:picLocks noChangeAspect="1"/>
+          </p:cNvPicPr>
+          <p:nvPr/>
+        </p:nvPicPr>
+        <p:blipFill>
+          <a:blip r:embed="rId4"/>
+          <a:stretch>
+            <a:fillRect/>
+          </a:stretch>
+        </p:blipFill>
+        <p:spPr>
+          <a:xfrm>
+            <a:off x="5699880" y="2026413"/>
+            <a:ext cx="4953691" cy="3924848"/>
           </a:xfrm>
           <a:prstGeom prst="rect">
             <a:avLst/>
@@ -3757,7 +3825,7 @@
     </p:spTree>
     <p:extLst>
       <p:ext uri="{BB962C8B-B14F-4D97-AF65-F5344CB8AC3E}">
-        <p14:creationId xmlns:p14="http://schemas.microsoft.com/office/powerpoint/2010/main" val="158133589"/>
+        <p14:creationId xmlns:p14="http://schemas.microsoft.com/office/powerpoint/2010/main" val="1747407130"/>
       </p:ext>
     </p:extLst>
   </p:cSld>
@@ -3789,7 +3857,7 @@
           <p:cNvPr id="2" name="Title 1">
             <a:extLst>
               <a:ext uri="{FF2B5EF4-FFF2-40B4-BE49-F238E27FC236}">
-                <a16:creationId xmlns:a16="http://schemas.microsoft.com/office/drawing/2014/main" id="{04666C4E-EB66-01BB-5DD4-739B99A1F556}"/>
+                <a16:creationId xmlns:a16="http://schemas.microsoft.com/office/drawing/2014/main" id="{42CCA484-5816-E8A4-6F83-3B7053A472F0}"/>
               </a:ext>
             </a:extLst>
           </p:cNvPr>
@@ -3807,7 +3875,7 @@
           <a:p>
             <a:r>
               <a:rPr lang="en-NZ" dirty="0"/>
-              <a:t>List</a:t>
+              <a:t>Annotations</a:t>
             </a:r>
           </a:p>
         </p:txBody>
@@ -3817,7 +3885,7 @@
           <p:cNvPr id="5" name="Content Placeholder 4">
             <a:extLst>
               <a:ext uri="{FF2B5EF4-FFF2-40B4-BE49-F238E27FC236}">
-                <a16:creationId xmlns:a16="http://schemas.microsoft.com/office/drawing/2014/main" id="{62CC1931-E7B6-DFB9-9C5B-1507194E2D02}"/>
+                <a16:creationId xmlns:a16="http://schemas.microsoft.com/office/drawing/2014/main" id="{DBB9AD8C-30BB-7CD3-7678-451A688E4BA8}"/>
               </a:ext>
             </a:extLst>
           </p:cNvPr>
@@ -3836,45 +3904,15 @@
         </p:blipFill>
         <p:spPr>
           <a:xfrm>
-            <a:off x="838200" y="1871445"/>
-            <a:ext cx="5229955" cy="3115110"/>
-          </a:xfrm>
-        </p:spPr>
-      </p:pic>
-      <p:pic>
-        <p:nvPicPr>
-          <p:cNvPr id="7" name="Picture 6">
-            <a:extLst>
-              <a:ext uri="{FF2B5EF4-FFF2-40B4-BE49-F238E27FC236}">
-                <a16:creationId xmlns:a16="http://schemas.microsoft.com/office/drawing/2014/main" id="{83ED42D6-8158-DE86-52DF-C78A3F078C65}"/>
-              </a:ext>
-            </a:extLst>
-          </p:cNvPr>
-          <p:cNvPicPr>
-            <a:picLocks noChangeAspect="1"/>
-          </p:cNvPicPr>
-          <p:nvPr/>
-        </p:nvPicPr>
-        <p:blipFill>
-          <a:blip r:embed="rId3"/>
-          <a:stretch>
-            <a:fillRect/>
-          </a:stretch>
-        </p:blipFill>
-        <p:spPr>
-          <a:xfrm>
-            <a:off x="6482146" y="1871445"/>
-            <a:ext cx="1467055" cy="1047896"/>
-          </a:xfrm>
-          <a:prstGeom prst="rect">
-            <a:avLst/>
-          </a:prstGeom>
+            <a:off x="2571258" y="2424686"/>
+            <a:ext cx="7049484" cy="3153215"/>
+          </a:xfrm>
         </p:spPr>
       </p:pic>
     </p:spTree>
     <p:extLst>
       <p:ext uri="{BB962C8B-B14F-4D97-AF65-F5344CB8AC3E}">
-        <p14:creationId xmlns:p14="http://schemas.microsoft.com/office/powerpoint/2010/main" val="3364883962"/>
+        <p14:creationId xmlns:p14="http://schemas.microsoft.com/office/powerpoint/2010/main" val="3103273502"/>
       </p:ext>
     </p:extLst>
   </p:cSld>
@@ -3906,7 +3944,7 @@
           <p:cNvPr id="2" name="Title 1">
             <a:extLst>
               <a:ext uri="{FF2B5EF4-FFF2-40B4-BE49-F238E27FC236}">
-                <a16:creationId xmlns:a16="http://schemas.microsoft.com/office/drawing/2014/main" id="{EF743613-2113-E28A-8621-060C5816AFA0}"/>
+                <a16:creationId xmlns:a16="http://schemas.microsoft.com/office/drawing/2014/main" id="{11A17548-769B-F76E-716D-321A2D573848}"/>
               </a:ext>
             </a:extLst>
           </p:cNvPr>
@@ -3924,17 +3962,17 @@
           <a:p>
             <a:r>
               <a:rPr lang="en-NZ" dirty="0"/>
-              <a:t>Enum Types</a:t>
+              <a:t>Interface</a:t>
             </a:r>
           </a:p>
         </p:txBody>
       </p:sp>
       <p:pic>
         <p:nvPicPr>
-          <p:cNvPr id="9" name="Content Placeholder 8">
-            <a:extLst>
-              <a:ext uri="{FF2B5EF4-FFF2-40B4-BE49-F238E27FC236}">
-                <a16:creationId xmlns:a16="http://schemas.microsoft.com/office/drawing/2014/main" id="{C85A3F22-EFE0-AEFD-4670-33D6C3AE7C6E}"/>
+          <p:cNvPr id="4" name="Content Placeholder 4">
+            <a:extLst>
+              <a:ext uri="{FF2B5EF4-FFF2-40B4-BE49-F238E27FC236}">
+                <a16:creationId xmlns:a16="http://schemas.microsoft.com/office/drawing/2014/main" id="{9E156D7C-FA91-2B82-5F75-081103D649F8}"/>
               </a:ext>
             </a:extLst>
           </p:cNvPr>
@@ -3953,75 +3991,15 @@
         </p:blipFill>
         <p:spPr>
           <a:xfrm>
-            <a:off x="838200" y="1690688"/>
-            <a:ext cx="3515216" cy="1457528"/>
-          </a:xfrm>
-        </p:spPr>
-      </p:pic>
-      <p:pic>
-        <p:nvPicPr>
-          <p:cNvPr id="11" name="Picture 10">
-            <a:extLst>
-              <a:ext uri="{FF2B5EF4-FFF2-40B4-BE49-F238E27FC236}">
-                <a16:creationId xmlns:a16="http://schemas.microsoft.com/office/drawing/2014/main" id="{E08E27B6-2045-DC77-4E2C-D4493BC27572}"/>
-              </a:ext>
-            </a:extLst>
-          </p:cNvPr>
-          <p:cNvPicPr>
-            <a:picLocks noChangeAspect="1"/>
-          </p:cNvPicPr>
-          <p:nvPr/>
-        </p:nvPicPr>
-        <p:blipFill>
-          <a:blip r:embed="rId3"/>
-          <a:stretch>
-            <a:fillRect/>
-          </a:stretch>
-        </p:blipFill>
-        <p:spPr>
-          <a:xfrm>
-            <a:off x="838200" y="3405673"/>
-            <a:ext cx="4077269" cy="2295845"/>
-          </a:xfrm>
-          <a:prstGeom prst="rect">
-            <a:avLst/>
-          </a:prstGeom>
-        </p:spPr>
-      </p:pic>
-      <p:pic>
-        <p:nvPicPr>
-          <p:cNvPr id="13" name="Picture 12">
-            <a:extLst>
-              <a:ext uri="{FF2B5EF4-FFF2-40B4-BE49-F238E27FC236}">
-                <a16:creationId xmlns:a16="http://schemas.microsoft.com/office/drawing/2014/main" id="{6534D1A4-334B-5FAE-F317-7B9A31A03503}"/>
-              </a:ext>
-            </a:extLst>
-          </p:cNvPr>
-          <p:cNvPicPr>
-            <a:picLocks noChangeAspect="1"/>
-          </p:cNvPicPr>
-          <p:nvPr/>
-        </p:nvPicPr>
-        <p:blipFill>
-          <a:blip r:embed="rId4"/>
-          <a:stretch>
-            <a:fillRect/>
-          </a:stretch>
-        </p:blipFill>
-        <p:spPr>
-          <a:xfrm>
-            <a:off x="5699880" y="2026413"/>
-            <a:ext cx="4953691" cy="3924848"/>
-          </a:xfrm>
-          <a:prstGeom prst="rect">
-            <a:avLst/>
-          </a:prstGeom>
+            <a:off x="4119286" y="2643792"/>
+            <a:ext cx="3953427" cy="2715004"/>
+          </a:xfrm>
         </p:spPr>
       </p:pic>
     </p:spTree>
     <p:extLst>
       <p:ext uri="{BB962C8B-B14F-4D97-AF65-F5344CB8AC3E}">
-        <p14:creationId xmlns:p14="http://schemas.microsoft.com/office/powerpoint/2010/main" val="1747407130"/>
+        <p14:creationId xmlns:p14="http://schemas.microsoft.com/office/powerpoint/2010/main" val="225157319"/>
       </p:ext>
     </p:extLst>
   </p:cSld>
@@ -4053,7 +4031,7 @@
           <p:cNvPr id="2" name="Title 1">
             <a:extLst>
               <a:ext uri="{FF2B5EF4-FFF2-40B4-BE49-F238E27FC236}">
-                <a16:creationId xmlns:a16="http://schemas.microsoft.com/office/drawing/2014/main" id="{42CCA484-5816-E8A4-6F83-3B7053A472F0}"/>
+                <a16:creationId xmlns:a16="http://schemas.microsoft.com/office/drawing/2014/main" id="{CD266589-7257-BFB1-40E1-5781B650DD0D}"/>
               </a:ext>
             </a:extLst>
           </p:cNvPr>
@@ -4071,26 +4049,24 @@
           <a:p>
             <a:r>
               <a:rPr lang="en-NZ" dirty="0"/>
-              <a:t>Annotations</a:t>
+              <a:t>Inheritance</a:t>
             </a:r>
           </a:p>
         </p:txBody>
       </p:sp>
       <p:pic>
         <p:nvPicPr>
-          <p:cNvPr id="5" name="Content Placeholder 4">
-            <a:extLst>
-              <a:ext uri="{FF2B5EF4-FFF2-40B4-BE49-F238E27FC236}">
-                <a16:creationId xmlns:a16="http://schemas.microsoft.com/office/drawing/2014/main" id="{DBB9AD8C-30BB-7CD3-7678-451A688E4BA8}"/>
+          <p:cNvPr id="7" name="Picture 6">
+            <a:extLst>
+              <a:ext uri="{FF2B5EF4-FFF2-40B4-BE49-F238E27FC236}">
+                <a16:creationId xmlns:a16="http://schemas.microsoft.com/office/drawing/2014/main" id="{57BFA67B-BB08-54F5-927C-C5B01A5EC32F}"/>
               </a:ext>
             </a:extLst>
           </p:cNvPr>
           <p:cNvPicPr>
-            <a:picLocks noGrp="1" noChangeAspect="1"/>
+            <a:picLocks noChangeAspect="1"/>
           </p:cNvPicPr>
-          <p:nvPr>
-            <p:ph idx="1"/>
-          </p:nvPr>
+          <p:nvPr/>
         </p:nvPicPr>
         <p:blipFill>
           <a:blip r:embed="rId2"/>
@@ -4100,15 +4076,107 @@
         </p:blipFill>
         <p:spPr>
           <a:xfrm>
-            <a:off x="2571258" y="2424686"/>
-            <a:ext cx="7049484" cy="3153215"/>
-          </a:xfrm>
+            <a:off x="4472805" y="1738076"/>
+            <a:ext cx="3600953" cy="3381847"/>
+          </a:xfrm>
+          <a:prstGeom prst="rect">
+            <a:avLst/>
+          </a:prstGeom>
+        </p:spPr>
+      </p:pic>
+      <p:pic>
+        <p:nvPicPr>
+          <p:cNvPr id="11" name="Content Placeholder 10">
+            <a:extLst>
+              <a:ext uri="{FF2B5EF4-FFF2-40B4-BE49-F238E27FC236}">
+                <a16:creationId xmlns:a16="http://schemas.microsoft.com/office/drawing/2014/main" id="{50E62A39-EE03-886D-39C3-7FE5AC004F48}"/>
+              </a:ext>
+            </a:extLst>
+          </p:cNvPr>
+          <p:cNvPicPr>
+            <a:picLocks noGrp="1" noChangeAspect="1"/>
+          </p:cNvPicPr>
+          <p:nvPr>
+            <p:ph idx="1"/>
+          </p:nvPr>
+        </p:nvPicPr>
+        <p:blipFill>
+          <a:blip r:embed="rId3"/>
+          <a:stretch>
+            <a:fillRect/>
+          </a:stretch>
+        </p:blipFill>
+        <p:spPr>
+          <a:xfrm>
+            <a:off x="643221" y="1740526"/>
+            <a:ext cx="3829584" cy="447737"/>
+          </a:xfrm>
+        </p:spPr>
+      </p:pic>
+      <p:pic>
+        <p:nvPicPr>
+          <p:cNvPr id="13" name="Picture 12">
+            <a:extLst>
+              <a:ext uri="{FF2B5EF4-FFF2-40B4-BE49-F238E27FC236}">
+                <a16:creationId xmlns:a16="http://schemas.microsoft.com/office/drawing/2014/main" id="{930B39AE-CE1A-E6F8-D8F7-0D029A4B438D}"/>
+              </a:ext>
+            </a:extLst>
+          </p:cNvPr>
+          <p:cNvPicPr>
+            <a:picLocks noChangeAspect="1"/>
+          </p:cNvPicPr>
+          <p:nvPr/>
+        </p:nvPicPr>
+        <p:blipFill>
+          <a:blip r:embed="rId4"/>
+          <a:stretch>
+            <a:fillRect/>
+          </a:stretch>
+        </p:blipFill>
+        <p:spPr>
+          <a:xfrm>
+            <a:off x="643221" y="2369618"/>
+            <a:ext cx="3600953" cy="943107"/>
+          </a:xfrm>
+          <a:prstGeom prst="rect">
+            <a:avLst/>
+          </a:prstGeom>
+        </p:spPr>
+      </p:pic>
+      <p:pic>
+        <p:nvPicPr>
+          <p:cNvPr id="15" name="Picture 14">
+            <a:extLst>
+              <a:ext uri="{FF2B5EF4-FFF2-40B4-BE49-F238E27FC236}">
+                <a16:creationId xmlns:a16="http://schemas.microsoft.com/office/drawing/2014/main" id="{FB823E39-A981-0773-5C3A-69A32AAE6558}"/>
+              </a:ext>
+            </a:extLst>
+          </p:cNvPr>
+          <p:cNvPicPr>
+            <a:picLocks noChangeAspect="1"/>
+          </p:cNvPicPr>
+          <p:nvPr/>
+        </p:nvPicPr>
+        <p:blipFill>
+          <a:blip r:embed="rId5"/>
+          <a:stretch>
+            <a:fillRect/>
+          </a:stretch>
+        </p:blipFill>
+        <p:spPr>
+          <a:xfrm>
+            <a:off x="643221" y="3428999"/>
+            <a:ext cx="1648055" cy="619211"/>
+          </a:xfrm>
+          <a:prstGeom prst="rect">
+            <a:avLst/>
+          </a:prstGeom>
         </p:spPr>
       </p:pic>
     </p:spTree>
     <p:extLst>
       <p:ext uri="{BB962C8B-B14F-4D97-AF65-F5344CB8AC3E}">
-        <p14:creationId xmlns:p14="http://schemas.microsoft.com/office/powerpoint/2010/main" val="3103273502"/>
+        <p14:creationId xmlns:p14="http://schemas.microsoft.com/office/powerpoint/2010/main" val="1292752356"/>
       </p:ext>
     </p:extLst>
   </p:cSld>
@@ -4140,7 +4208,7 @@
           <p:cNvPr id="2" name="Title 1">
             <a:extLst>
               <a:ext uri="{FF2B5EF4-FFF2-40B4-BE49-F238E27FC236}">
-                <a16:creationId xmlns:a16="http://schemas.microsoft.com/office/drawing/2014/main" id="{11A17548-769B-F76E-716D-321A2D573848}"/>
+                <a16:creationId xmlns:a16="http://schemas.microsoft.com/office/drawing/2014/main" id="{C931E766-07DA-5257-1248-B970C8D145A6}"/>
               </a:ext>
             </a:extLst>
           </p:cNvPr>
@@ -4158,17 +4226,17 @@
           <a:p>
             <a:r>
               <a:rPr lang="en-NZ" dirty="0"/>
-              <a:t>Interface</a:t>
+              <a:t>Generics</a:t>
             </a:r>
           </a:p>
         </p:txBody>
       </p:sp>
       <p:pic>
         <p:nvPicPr>
-          <p:cNvPr id="4" name="Content Placeholder 4">
-            <a:extLst>
-              <a:ext uri="{FF2B5EF4-FFF2-40B4-BE49-F238E27FC236}">
-                <a16:creationId xmlns:a16="http://schemas.microsoft.com/office/drawing/2014/main" id="{9E156D7C-FA91-2B82-5F75-081103D649F8}"/>
+          <p:cNvPr id="5" name="Content Placeholder 4">
+            <a:extLst>
+              <a:ext uri="{FF2B5EF4-FFF2-40B4-BE49-F238E27FC236}">
+                <a16:creationId xmlns:a16="http://schemas.microsoft.com/office/drawing/2014/main" id="{7F905DD6-D22E-57DC-AADC-A4B6D0B7F05E}"/>
               </a:ext>
             </a:extLst>
           </p:cNvPr>
@@ -4187,15 +4255,45 @@
         </p:blipFill>
         <p:spPr>
           <a:xfrm>
-            <a:off x="4119286" y="2643792"/>
-            <a:ext cx="3953427" cy="2715004"/>
-          </a:xfrm>
+            <a:off x="838200" y="1690688"/>
+            <a:ext cx="4839375" cy="2638793"/>
+          </a:xfrm>
+        </p:spPr>
+      </p:pic>
+      <p:pic>
+        <p:nvPicPr>
+          <p:cNvPr id="7" name="Picture 6">
+            <a:extLst>
+              <a:ext uri="{FF2B5EF4-FFF2-40B4-BE49-F238E27FC236}">
+                <a16:creationId xmlns:a16="http://schemas.microsoft.com/office/drawing/2014/main" id="{49B5EAC3-4B7B-F054-1C4C-7020C9A858A2}"/>
+              </a:ext>
+            </a:extLst>
+          </p:cNvPr>
+          <p:cNvPicPr>
+            <a:picLocks noChangeAspect="1"/>
+          </p:cNvPicPr>
+          <p:nvPr/>
+        </p:nvPicPr>
+        <p:blipFill>
+          <a:blip r:embed="rId3"/>
+          <a:stretch>
+            <a:fillRect/>
+          </a:stretch>
+        </p:blipFill>
+        <p:spPr>
+          <a:xfrm>
+            <a:off x="6096000" y="4380799"/>
+            <a:ext cx="4772691" cy="1457528"/>
+          </a:xfrm>
+          <a:prstGeom prst="rect">
+            <a:avLst/>
+          </a:prstGeom>
         </p:spPr>
       </p:pic>
     </p:spTree>
     <p:extLst>
       <p:ext uri="{BB962C8B-B14F-4D97-AF65-F5344CB8AC3E}">
-        <p14:creationId xmlns:p14="http://schemas.microsoft.com/office/powerpoint/2010/main" val="225157319"/>
+        <p14:creationId xmlns:p14="http://schemas.microsoft.com/office/powerpoint/2010/main" val="1706139014"/>
       </p:ext>
     </p:extLst>
   </p:cSld>
@@ -4227,7 +4325,7 @@
           <p:cNvPr id="2" name="Title 1">
             <a:extLst>
               <a:ext uri="{FF2B5EF4-FFF2-40B4-BE49-F238E27FC236}">
-                <a16:creationId xmlns:a16="http://schemas.microsoft.com/office/drawing/2014/main" id="{CD266589-7257-BFB1-40E1-5781B650DD0D}"/>
+                <a16:creationId xmlns:a16="http://schemas.microsoft.com/office/drawing/2014/main" id="{00A4ECD4-4FCC-FECF-7227-BA5C9EF03FA8}"/>
               </a:ext>
             </a:extLst>
           </p:cNvPr>
@@ -4245,134 +4343,40 @@
           <a:p>
             <a:r>
               <a:rPr lang="en-NZ" dirty="0"/>
-              <a:t>Inheritance</a:t>
-            </a:r>
-          </a:p>
-        </p:txBody>
-      </p:sp>
-      <p:pic>
-        <p:nvPicPr>
-          <p:cNvPr id="7" name="Picture 6">
-            <a:extLst>
-              <a:ext uri="{FF2B5EF4-FFF2-40B4-BE49-F238E27FC236}">
-                <a16:creationId xmlns:a16="http://schemas.microsoft.com/office/drawing/2014/main" id="{57BFA67B-BB08-54F5-927C-C5B01A5EC32F}"/>
-              </a:ext>
-            </a:extLst>
-          </p:cNvPr>
-          <p:cNvPicPr>
-            <a:picLocks noChangeAspect="1"/>
-          </p:cNvPicPr>
-          <p:nvPr/>
-        </p:nvPicPr>
-        <p:blipFill>
-          <a:blip r:embed="rId2"/>
-          <a:stretch>
-            <a:fillRect/>
-          </a:stretch>
-        </p:blipFill>
-        <p:spPr>
-          <a:xfrm>
-            <a:off x="4472805" y="1738076"/>
-            <a:ext cx="3600953" cy="3381847"/>
-          </a:xfrm>
-          <a:prstGeom prst="rect">
-            <a:avLst/>
-          </a:prstGeom>
-        </p:spPr>
-      </p:pic>
-      <p:pic>
-        <p:nvPicPr>
-          <p:cNvPr id="11" name="Content Placeholder 10">
-            <a:extLst>
-              <a:ext uri="{FF2B5EF4-FFF2-40B4-BE49-F238E27FC236}">
-                <a16:creationId xmlns:a16="http://schemas.microsoft.com/office/drawing/2014/main" id="{50E62A39-EE03-886D-39C3-7FE5AC004F48}"/>
-              </a:ext>
-            </a:extLst>
-          </p:cNvPr>
-          <p:cNvPicPr>
-            <a:picLocks noGrp="1" noChangeAspect="1"/>
-          </p:cNvPicPr>
+              <a:t>Packages</a:t>
+            </a:r>
+          </a:p>
+        </p:txBody>
+      </p:sp>
+      <p:sp>
+        <p:nvSpPr>
+          <p:cNvPr id="3" name="Content Placeholder 2">
+            <a:extLst>
+              <a:ext uri="{FF2B5EF4-FFF2-40B4-BE49-F238E27FC236}">
+                <a16:creationId xmlns:a16="http://schemas.microsoft.com/office/drawing/2014/main" id="{759E803D-ECF5-8ED9-3670-469E5249EFFA}"/>
+              </a:ext>
+            </a:extLst>
+          </p:cNvPr>
+          <p:cNvSpPr>
+            <a:spLocks noGrp="1"/>
+          </p:cNvSpPr>
           <p:nvPr>
             <p:ph idx="1"/>
           </p:nvPr>
-        </p:nvPicPr>
-        <p:blipFill>
-          <a:blip r:embed="rId3"/>
-          <a:stretch>
-            <a:fillRect/>
-          </a:stretch>
-        </p:blipFill>
-        <p:spPr>
-          <a:xfrm>
-            <a:off x="643221" y="1740526"/>
-            <a:ext cx="3829584" cy="447737"/>
-          </a:xfrm>
-        </p:spPr>
-      </p:pic>
-      <p:pic>
-        <p:nvPicPr>
-          <p:cNvPr id="13" name="Picture 12">
-            <a:extLst>
-              <a:ext uri="{FF2B5EF4-FFF2-40B4-BE49-F238E27FC236}">
-                <a16:creationId xmlns:a16="http://schemas.microsoft.com/office/drawing/2014/main" id="{930B39AE-CE1A-E6F8-D8F7-0D029A4B438D}"/>
-              </a:ext>
-            </a:extLst>
-          </p:cNvPr>
-          <p:cNvPicPr>
-            <a:picLocks noChangeAspect="1"/>
-          </p:cNvPicPr>
-          <p:nvPr/>
-        </p:nvPicPr>
-        <p:blipFill>
-          <a:blip r:embed="rId4"/>
-          <a:stretch>
-            <a:fillRect/>
-          </a:stretch>
-        </p:blipFill>
-        <p:spPr>
-          <a:xfrm>
-            <a:off x="643221" y="2369618"/>
-            <a:ext cx="3600953" cy="943107"/>
-          </a:xfrm>
-          <a:prstGeom prst="rect">
-            <a:avLst/>
-          </a:prstGeom>
-        </p:spPr>
-      </p:pic>
-      <p:pic>
-        <p:nvPicPr>
-          <p:cNvPr id="15" name="Picture 14">
-            <a:extLst>
-              <a:ext uri="{FF2B5EF4-FFF2-40B4-BE49-F238E27FC236}">
-                <a16:creationId xmlns:a16="http://schemas.microsoft.com/office/drawing/2014/main" id="{FB823E39-A981-0773-5C3A-69A32AAE6558}"/>
-              </a:ext>
-            </a:extLst>
-          </p:cNvPr>
-          <p:cNvPicPr>
-            <a:picLocks noChangeAspect="1"/>
-          </p:cNvPicPr>
-          <p:nvPr/>
-        </p:nvPicPr>
-        <p:blipFill>
-          <a:blip r:embed="rId5"/>
-          <a:stretch>
-            <a:fillRect/>
-          </a:stretch>
-        </p:blipFill>
-        <p:spPr>
-          <a:xfrm>
-            <a:off x="643221" y="3428999"/>
-            <a:ext cx="1648055" cy="619211"/>
-          </a:xfrm>
-          <a:prstGeom prst="rect">
-            <a:avLst/>
-          </a:prstGeom>
-        </p:spPr>
-      </p:pic>
+        </p:nvSpPr>
+        <p:spPr/>
+        <p:txBody>
+          <a:bodyPr/>
+          <a:lstStyle/>
+          <a:p>
+            <a:endParaRPr lang="en-NZ"/>
+          </a:p>
+        </p:txBody>
+      </p:sp>
     </p:spTree>
     <p:extLst>
       <p:ext uri="{BB962C8B-B14F-4D97-AF65-F5344CB8AC3E}">
-        <p14:creationId xmlns:p14="http://schemas.microsoft.com/office/powerpoint/2010/main" val="1292752356"/>
+        <p14:creationId xmlns:p14="http://schemas.microsoft.com/office/powerpoint/2010/main" val="1565560231"/>
       </p:ext>
     </p:extLst>
   </p:cSld>
@@ -4404,7 +4408,7 @@
           <p:cNvPr id="2" name="Title 1">
             <a:extLst>
               <a:ext uri="{FF2B5EF4-FFF2-40B4-BE49-F238E27FC236}">
-                <a16:creationId xmlns:a16="http://schemas.microsoft.com/office/drawing/2014/main" id="{C931E766-07DA-5257-1248-B970C8D145A6}"/>
+                <a16:creationId xmlns:a16="http://schemas.microsoft.com/office/drawing/2014/main" id="{8E20B3AF-14F4-0CA9-B000-DA25F190F446}"/>
               </a:ext>
             </a:extLst>
           </p:cNvPr>
@@ -4422,7 +4426,7 @@
           <a:p>
             <a:r>
               <a:rPr lang="en-NZ" dirty="0"/>
-              <a:t>Generics</a:t>
+              <a:t>File I/O streams</a:t>
             </a:r>
           </a:p>
         </p:txBody>
@@ -4432,7 +4436,7 @@
           <p:cNvPr id="5" name="Content Placeholder 4">
             <a:extLst>
               <a:ext uri="{FF2B5EF4-FFF2-40B4-BE49-F238E27FC236}">
-                <a16:creationId xmlns:a16="http://schemas.microsoft.com/office/drawing/2014/main" id="{7F905DD6-D22E-57DC-AADC-A4B6D0B7F05E}"/>
+                <a16:creationId xmlns:a16="http://schemas.microsoft.com/office/drawing/2014/main" id="{65517D84-D5F1-16A7-0D89-3D1A6B1B3E14}"/>
               </a:ext>
             </a:extLst>
           </p:cNvPr>
@@ -4451,8 +4455,8 @@
         </p:blipFill>
         <p:spPr>
           <a:xfrm>
-            <a:off x="838200" y="1690688"/>
-            <a:ext cx="4839375" cy="2638793"/>
+            <a:off x="838200" y="1341617"/>
+            <a:ext cx="9288171" cy="2314898"/>
           </a:xfrm>
         </p:spPr>
       </p:pic>
@@ -4461,7 +4465,7 @@
           <p:cNvPr id="7" name="Picture 6">
             <a:extLst>
               <a:ext uri="{FF2B5EF4-FFF2-40B4-BE49-F238E27FC236}">
-                <a16:creationId xmlns:a16="http://schemas.microsoft.com/office/drawing/2014/main" id="{49B5EAC3-4B7B-F054-1C4C-7020C9A858A2}"/>
+                <a16:creationId xmlns:a16="http://schemas.microsoft.com/office/drawing/2014/main" id="{9C852F8A-4829-9009-CE01-D5093B44C182}"/>
               </a:ext>
             </a:extLst>
           </p:cNvPr>
@@ -4478,8 +4482,38 @@
         </p:blipFill>
         <p:spPr>
           <a:xfrm>
-            <a:off x="6096000" y="4380799"/>
-            <a:ext cx="4772691" cy="1457528"/>
+            <a:off x="838200" y="3754595"/>
+            <a:ext cx="2600688" cy="1457528"/>
+          </a:xfrm>
+          <a:prstGeom prst="rect">
+            <a:avLst/>
+          </a:prstGeom>
+        </p:spPr>
+      </p:pic>
+      <p:pic>
+        <p:nvPicPr>
+          <p:cNvPr id="9" name="Picture 8">
+            <a:extLst>
+              <a:ext uri="{FF2B5EF4-FFF2-40B4-BE49-F238E27FC236}">
+                <a16:creationId xmlns:a16="http://schemas.microsoft.com/office/drawing/2014/main" id="{155205B3-90BC-4C28-4C0C-AFB30252A814}"/>
+              </a:ext>
+            </a:extLst>
+          </p:cNvPr>
+          <p:cNvPicPr>
+            <a:picLocks noChangeAspect="1"/>
+          </p:cNvPicPr>
+          <p:nvPr/>
+        </p:nvPicPr>
+        <p:blipFill>
+          <a:blip r:embed="rId4"/>
+          <a:stretch>
+            <a:fillRect/>
+          </a:stretch>
+        </p:blipFill>
+        <p:spPr>
+          <a:xfrm>
+            <a:off x="3800935" y="3599995"/>
+            <a:ext cx="3153215" cy="3258005"/>
           </a:xfrm>
           <a:prstGeom prst="rect">
             <a:avLst/>
@@ -4489,7 +4523,7 @@
     </p:spTree>
     <p:extLst>
       <p:ext uri="{BB962C8B-B14F-4D97-AF65-F5344CB8AC3E}">
-        <p14:creationId xmlns:p14="http://schemas.microsoft.com/office/powerpoint/2010/main" val="1706139014"/>
+        <p14:creationId xmlns:p14="http://schemas.microsoft.com/office/powerpoint/2010/main" val="1004201289"/>
       </p:ext>
     </p:extLst>
   </p:cSld>
@@ -4521,7 +4555,7 @@
           <p:cNvPr id="2" name="Title 1">
             <a:extLst>
               <a:ext uri="{FF2B5EF4-FFF2-40B4-BE49-F238E27FC236}">
-                <a16:creationId xmlns:a16="http://schemas.microsoft.com/office/drawing/2014/main" id="{00A4ECD4-4FCC-FECF-7227-BA5C9EF03FA8}"/>
+                <a16:creationId xmlns:a16="http://schemas.microsoft.com/office/drawing/2014/main" id="{4E21A2B0-E314-C37E-95BB-059B57478F9B}"/>
               </a:ext>
             </a:extLst>
           </p:cNvPr>
@@ -4539,40 +4573,44 @@
           <a:p>
             <a:r>
               <a:rPr lang="en-NZ" dirty="0"/>
-              <a:t>Packages</a:t>
-            </a:r>
-          </a:p>
-        </p:txBody>
-      </p:sp>
-      <p:sp>
-        <p:nvSpPr>
-          <p:cNvPr id="3" name="Content Placeholder 2">
-            <a:extLst>
-              <a:ext uri="{FF2B5EF4-FFF2-40B4-BE49-F238E27FC236}">
-                <a16:creationId xmlns:a16="http://schemas.microsoft.com/office/drawing/2014/main" id="{759E803D-ECF5-8ED9-3670-469E5249EFFA}"/>
-              </a:ext>
-            </a:extLst>
-          </p:cNvPr>
-          <p:cNvSpPr>
-            <a:spLocks noGrp="1"/>
-          </p:cNvSpPr>
+              <a:t>Exceptions</a:t>
+            </a:r>
+          </a:p>
+        </p:txBody>
+      </p:sp>
+      <p:pic>
+        <p:nvPicPr>
+          <p:cNvPr id="5" name="Content Placeholder 4">
+            <a:extLst>
+              <a:ext uri="{FF2B5EF4-FFF2-40B4-BE49-F238E27FC236}">
+                <a16:creationId xmlns:a16="http://schemas.microsoft.com/office/drawing/2014/main" id="{F35F612C-CD5B-8979-76A6-D7936B656E5F}"/>
+              </a:ext>
+            </a:extLst>
+          </p:cNvPr>
+          <p:cNvPicPr>
+            <a:picLocks noGrp="1" noChangeAspect="1"/>
+          </p:cNvPicPr>
           <p:nvPr>
             <p:ph idx="1"/>
           </p:nvPr>
-        </p:nvSpPr>
-        <p:spPr/>
-        <p:txBody>
-          <a:bodyPr/>
-          <a:lstStyle/>
-          <a:p>
-            <a:endParaRPr lang="en-NZ"/>
-          </a:p>
-        </p:txBody>
-      </p:sp>
+        </p:nvPicPr>
+        <p:blipFill>
+          <a:blip r:embed="rId2"/>
+          <a:stretch>
+            <a:fillRect/>
+          </a:stretch>
+        </p:blipFill>
+        <p:spPr>
+          <a:xfrm>
+            <a:off x="2499810" y="3058187"/>
+            <a:ext cx="7192379" cy="1886213"/>
+          </a:xfrm>
+        </p:spPr>
+      </p:pic>
     </p:spTree>
     <p:extLst>
       <p:ext uri="{BB962C8B-B14F-4D97-AF65-F5344CB8AC3E}">
-        <p14:creationId xmlns:p14="http://schemas.microsoft.com/office/powerpoint/2010/main" val="1565560231"/>
+        <p14:creationId xmlns:p14="http://schemas.microsoft.com/office/powerpoint/2010/main" val="2336121550"/>
       </p:ext>
     </p:extLst>
   </p:cSld>
@@ -4604,7 +4642,7 @@
           <p:cNvPr id="2" name="Title 1">
             <a:extLst>
               <a:ext uri="{FF2B5EF4-FFF2-40B4-BE49-F238E27FC236}">
-                <a16:creationId xmlns:a16="http://schemas.microsoft.com/office/drawing/2014/main" id="{40CE5720-06A4-D83D-7F91-31FA321BF5DE}"/>
+                <a16:creationId xmlns:a16="http://schemas.microsoft.com/office/drawing/2014/main" id="{C07D79E9-AE88-2FEB-A180-F9D5206A4EE3}"/>
               </a:ext>
             </a:extLst>
           </p:cNvPr>
@@ -4615,27 +4653,51 @@
             <p:ph type="title"/>
           </p:nvPr>
         </p:nvSpPr>
-        <p:spPr>
-          <a:xfrm>
-            <a:off x="3841459" y="2529484"/>
-            <a:ext cx="10515600" cy="1325563"/>
-          </a:xfrm>
-        </p:spPr>
+        <p:spPr/>
         <p:txBody>
           <a:bodyPr/>
           <a:lstStyle/>
           <a:p>
             <a:r>
               <a:rPr lang="en-NZ" dirty="0"/>
-              <a:t>I’ve tried this</a:t>
-            </a:r>
-          </a:p>
-        </p:txBody>
-      </p:sp>
+              <a:t>Primitive Data Types</a:t>
+            </a:r>
+          </a:p>
+        </p:txBody>
+      </p:sp>
+      <p:pic>
+        <p:nvPicPr>
+          <p:cNvPr id="5" name="Content Placeholder 4">
+            <a:extLst>
+              <a:ext uri="{FF2B5EF4-FFF2-40B4-BE49-F238E27FC236}">
+                <a16:creationId xmlns:a16="http://schemas.microsoft.com/office/drawing/2014/main" id="{1FB56D65-1057-3DCB-93D9-BE50E8E9072A}"/>
+              </a:ext>
+            </a:extLst>
+          </p:cNvPr>
+          <p:cNvPicPr>
+            <a:picLocks noGrp="1" noChangeAspect="1"/>
+          </p:cNvPicPr>
+          <p:nvPr>
+            <p:ph idx="1"/>
+          </p:nvPr>
+        </p:nvPicPr>
+        <p:blipFill>
+          <a:blip r:embed="rId2"/>
+          <a:stretch>
+            <a:fillRect/>
+          </a:stretch>
+        </p:blipFill>
+        <p:spPr>
+          <a:xfrm>
+            <a:off x="4676577" y="3310635"/>
+            <a:ext cx="2838846" cy="1381318"/>
+          </a:xfrm>
+        </p:spPr>
+      </p:pic>
     </p:spTree>
     <p:extLst>
       <p:ext uri="{BB962C8B-B14F-4D97-AF65-F5344CB8AC3E}">
-        <p14:creationId xmlns:p14="http://schemas.microsoft.com/office/powerpoint/2010/main" val="647900388"/>
+        <p14:creationId xmlns:p14="http://schemas.microsoft.com/office/powerpoint/2010/main" val="725639315"/>
       </p:ext>
     </p:extLst>
   </p:cSld>
@@ -4667,7 +4729,7 @@
           <p:cNvPr id="2" name="Title 1">
             <a:extLst>
               <a:ext uri="{FF2B5EF4-FFF2-40B4-BE49-F238E27FC236}">
-                <a16:creationId xmlns:a16="http://schemas.microsoft.com/office/drawing/2014/main" id="{8E20B3AF-14F4-0CA9-B000-DA25F190F446}"/>
+                <a16:creationId xmlns:a16="http://schemas.microsoft.com/office/drawing/2014/main" id="{B4E73F9A-D206-7CB1-B06F-01C8CE5AFDC0}"/>
               </a:ext>
             </a:extLst>
           </p:cNvPr>
@@ -4685,40 +4747,44 @@
           <a:p>
             <a:r>
               <a:rPr lang="en-NZ" dirty="0"/>
-              <a:t>File I/O streams</a:t>
-            </a:r>
-          </a:p>
-        </p:txBody>
-      </p:sp>
-      <p:sp>
-        <p:nvSpPr>
-          <p:cNvPr id="3" name="Content Placeholder 2">
-            <a:extLst>
-              <a:ext uri="{FF2B5EF4-FFF2-40B4-BE49-F238E27FC236}">
-                <a16:creationId xmlns:a16="http://schemas.microsoft.com/office/drawing/2014/main" id="{1C5B1FC8-2F22-AD6B-9250-58957BEAA7D2}"/>
-              </a:ext>
-            </a:extLst>
-          </p:cNvPr>
-          <p:cNvSpPr>
-            <a:spLocks noGrp="1"/>
-          </p:cNvSpPr>
+              <a:t>autoboxing and unboxing</a:t>
+            </a:r>
+          </a:p>
+        </p:txBody>
+      </p:sp>
+      <p:pic>
+        <p:nvPicPr>
+          <p:cNvPr id="9" name="Content Placeholder 8">
+            <a:extLst>
+              <a:ext uri="{FF2B5EF4-FFF2-40B4-BE49-F238E27FC236}">
+                <a16:creationId xmlns:a16="http://schemas.microsoft.com/office/drawing/2014/main" id="{2A5DDEFA-04C5-690C-831A-D57D031DA317}"/>
+              </a:ext>
+            </a:extLst>
+          </p:cNvPr>
+          <p:cNvPicPr>
+            <a:picLocks noGrp="1" noChangeAspect="1"/>
+          </p:cNvPicPr>
           <p:nvPr>
             <p:ph idx="1"/>
           </p:nvPr>
-        </p:nvSpPr>
-        <p:spPr/>
-        <p:txBody>
-          <a:bodyPr/>
-          <a:lstStyle/>
-          <a:p>
-            <a:endParaRPr lang="en-NZ"/>
-          </a:p>
-        </p:txBody>
-      </p:sp>
+        </p:nvPicPr>
+        <p:blipFill>
+          <a:blip r:embed="rId2"/>
+          <a:stretch>
+            <a:fillRect/>
+          </a:stretch>
+        </p:blipFill>
+        <p:spPr>
+          <a:xfrm>
+            <a:off x="4366971" y="3377319"/>
+            <a:ext cx="3458058" cy="1247949"/>
+          </a:xfrm>
+        </p:spPr>
+      </p:pic>
     </p:spTree>
     <p:extLst>
       <p:ext uri="{BB962C8B-B14F-4D97-AF65-F5344CB8AC3E}">
-        <p14:creationId xmlns:p14="http://schemas.microsoft.com/office/powerpoint/2010/main" val="1004201289"/>
+        <p14:creationId xmlns:p14="http://schemas.microsoft.com/office/powerpoint/2010/main" val="3724127701"/>
       </p:ext>
     </p:extLst>
   </p:cSld>
@@ -4750,7 +4816,7 @@
           <p:cNvPr id="2" name="Title 1">
             <a:extLst>
               <a:ext uri="{FF2B5EF4-FFF2-40B4-BE49-F238E27FC236}">
-                <a16:creationId xmlns:a16="http://schemas.microsoft.com/office/drawing/2014/main" id="{4E21A2B0-E314-C37E-95BB-059B57478F9B}"/>
+                <a16:creationId xmlns:a16="http://schemas.microsoft.com/office/drawing/2014/main" id="{5D243D54-C1A8-5A1E-6785-77CC60F1FA54}"/>
               </a:ext>
             </a:extLst>
           </p:cNvPr>
@@ -4768,7 +4834,7 @@
           <a:p>
             <a:r>
               <a:rPr lang="en-NZ" dirty="0"/>
-              <a:t>Exceptions</a:t>
+              <a:t>StringBuilder</a:t>
             </a:r>
           </a:p>
         </p:txBody>
@@ -4778,7 +4844,7 @@
           <p:cNvPr id="5" name="Content Placeholder 4">
             <a:extLst>
               <a:ext uri="{FF2B5EF4-FFF2-40B4-BE49-F238E27FC236}">
-                <a16:creationId xmlns:a16="http://schemas.microsoft.com/office/drawing/2014/main" id="{F35F612C-CD5B-8979-76A6-D7936B656E5F}"/>
+                <a16:creationId xmlns:a16="http://schemas.microsoft.com/office/drawing/2014/main" id="{86CCABAC-00A5-E483-4746-CE7A345E77F3}"/>
               </a:ext>
             </a:extLst>
           </p:cNvPr>
@@ -4797,15 +4863,45 @@
         </p:blipFill>
         <p:spPr>
           <a:xfrm>
-            <a:off x="2499810" y="3058187"/>
-            <a:ext cx="7192379" cy="1886213"/>
-          </a:xfrm>
+            <a:off x="4400313" y="3186793"/>
+            <a:ext cx="3391373" cy="1629002"/>
+          </a:xfrm>
+        </p:spPr>
+      </p:pic>
+      <p:pic>
+        <p:nvPicPr>
+          <p:cNvPr id="7" name="Picture 6">
+            <a:extLst>
+              <a:ext uri="{FF2B5EF4-FFF2-40B4-BE49-F238E27FC236}">
+                <a16:creationId xmlns:a16="http://schemas.microsoft.com/office/drawing/2014/main" id="{38EE440F-0E52-AF01-36C2-2FBD4032D172}"/>
+              </a:ext>
+            </a:extLst>
+          </p:cNvPr>
+          <p:cNvPicPr>
+            <a:picLocks noChangeAspect="1"/>
+          </p:cNvPicPr>
+          <p:nvPr/>
+        </p:nvPicPr>
+        <p:blipFill>
+          <a:blip r:embed="rId3"/>
+          <a:stretch>
+            <a:fillRect/>
+          </a:stretch>
+        </p:blipFill>
+        <p:spPr>
+          <a:xfrm>
+            <a:off x="5055998" y="4815795"/>
+            <a:ext cx="1781424" cy="562053"/>
+          </a:xfrm>
+          <a:prstGeom prst="rect">
+            <a:avLst/>
+          </a:prstGeom>
         </p:spPr>
       </p:pic>
     </p:spTree>
     <p:extLst>
       <p:ext uri="{BB962C8B-B14F-4D97-AF65-F5344CB8AC3E}">
-        <p14:creationId xmlns:p14="http://schemas.microsoft.com/office/powerpoint/2010/main" val="2336121550"/>
+        <p14:creationId xmlns:p14="http://schemas.microsoft.com/office/powerpoint/2010/main" val="2353741229"/>
       </p:ext>
     </p:extLst>
   </p:cSld>
@@ -4837,7 +4933,7 @@
           <p:cNvPr id="2" name="Title 1">
             <a:extLst>
               <a:ext uri="{FF2B5EF4-FFF2-40B4-BE49-F238E27FC236}">
-                <a16:creationId xmlns:a16="http://schemas.microsoft.com/office/drawing/2014/main" id="{B4E73F9A-D206-7CB1-B06F-01C8CE5AFDC0}"/>
+                <a16:creationId xmlns:a16="http://schemas.microsoft.com/office/drawing/2014/main" id="{BAB69147-3B98-A99C-47B1-0B8D246F323C}"/>
               </a:ext>
             </a:extLst>
           </p:cNvPr>
@@ -4855,17 +4951,17 @@
           <a:p>
             <a:r>
               <a:rPr lang="en-NZ" dirty="0"/>
-              <a:t>autoboxing and unboxing</a:t>
+              <a:t>Switch expressions</a:t>
             </a:r>
           </a:p>
         </p:txBody>
       </p:sp>
       <p:pic>
         <p:nvPicPr>
-          <p:cNvPr id="9" name="Content Placeholder 8">
-            <a:extLst>
-              <a:ext uri="{FF2B5EF4-FFF2-40B4-BE49-F238E27FC236}">
-                <a16:creationId xmlns:a16="http://schemas.microsoft.com/office/drawing/2014/main" id="{2A5DDEFA-04C5-690C-831A-D57D031DA317}"/>
+          <p:cNvPr id="5" name="Content Placeholder 4">
+            <a:extLst>
+              <a:ext uri="{FF2B5EF4-FFF2-40B4-BE49-F238E27FC236}">
+                <a16:creationId xmlns:a16="http://schemas.microsoft.com/office/drawing/2014/main" id="{6229931E-8422-C26C-A654-30579CD0ECD6}"/>
               </a:ext>
             </a:extLst>
           </p:cNvPr>
@@ -4884,15 +4980,75 @@
         </p:blipFill>
         <p:spPr>
           <a:xfrm>
-            <a:off x="4366971" y="3377319"/>
-            <a:ext cx="3458058" cy="1247949"/>
-          </a:xfrm>
+            <a:off x="937288" y="1560005"/>
+            <a:ext cx="4887007" cy="2400635"/>
+          </a:xfrm>
+        </p:spPr>
+      </p:pic>
+      <p:pic>
+        <p:nvPicPr>
+          <p:cNvPr id="7" name="Picture 6">
+            <a:extLst>
+              <a:ext uri="{FF2B5EF4-FFF2-40B4-BE49-F238E27FC236}">
+                <a16:creationId xmlns:a16="http://schemas.microsoft.com/office/drawing/2014/main" id="{1042CEE6-6909-CB35-F114-3F274D5AA58B}"/>
+              </a:ext>
+            </a:extLst>
+          </p:cNvPr>
+          <p:cNvPicPr>
+            <a:picLocks noChangeAspect="1"/>
+          </p:cNvPicPr>
+          <p:nvPr/>
+        </p:nvPicPr>
+        <p:blipFill>
+          <a:blip r:embed="rId3"/>
+          <a:stretch>
+            <a:fillRect/>
+          </a:stretch>
+        </p:blipFill>
+        <p:spPr>
+          <a:xfrm>
+            <a:off x="5923383" y="2760322"/>
+            <a:ext cx="4105848" cy="1276528"/>
+          </a:xfrm>
+          <a:prstGeom prst="rect">
+            <a:avLst/>
+          </a:prstGeom>
+        </p:spPr>
+      </p:pic>
+      <p:pic>
+        <p:nvPicPr>
+          <p:cNvPr id="9" name="Picture 8">
+            <a:extLst>
+              <a:ext uri="{FF2B5EF4-FFF2-40B4-BE49-F238E27FC236}">
+                <a16:creationId xmlns:a16="http://schemas.microsoft.com/office/drawing/2014/main" id="{3BEC2169-0337-25E4-A366-0AD83EEDBD69}"/>
+              </a:ext>
+            </a:extLst>
+          </p:cNvPr>
+          <p:cNvPicPr>
+            <a:picLocks noChangeAspect="1"/>
+          </p:cNvPicPr>
+          <p:nvPr/>
+        </p:nvPicPr>
+        <p:blipFill>
+          <a:blip r:embed="rId4"/>
+          <a:stretch>
+            <a:fillRect/>
+          </a:stretch>
+        </p:blipFill>
+        <p:spPr>
+          <a:xfrm>
+            <a:off x="5923383" y="1560005"/>
+            <a:ext cx="3096057" cy="1114581"/>
+          </a:xfrm>
+          <a:prstGeom prst="rect">
+            <a:avLst/>
+          </a:prstGeom>
         </p:spPr>
       </p:pic>
     </p:spTree>
     <p:extLst>
       <p:ext uri="{BB962C8B-B14F-4D97-AF65-F5344CB8AC3E}">
-        <p14:creationId xmlns:p14="http://schemas.microsoft.com/office/powerpoint/2010/main" val="3724127701"/>
+        <p14:creationId xmlns:p14="http://schemas.microsoft.com/office/powerpoint/2010/main" val="3221706584"/>
       </p:ext>
     </p:extLst>
   </p:cSld>
@@ -4924,7 +5080,7 @@
           <p:cNvPr id="2" name="Title 1">
             <a:extLst>
               <a:ext uri="{FF2B5EF4-FFF2-40B4-BE49-F238E27FC236}">
-                <a16:creationId xmlns:a16="http://schemas.microsoft.com/office/drawing/2014/main" id="{5D243D54-C1A8-5A1E-6785-77CC60F1FA54}"/>
+                <a16:creationId xmlns:a16="http://schemas.microsoft.com/office/drawing/2014/main" id="{3D82688E-51D6-F3B4-2D85-7C0B0E039703}"/>
               </a:ext>
             </a:extLst>
           </p:cNvPr>
@@ -4942,74 +5098,40 @@
           <a:p>
             <a:r>
               <a:rPr lang="en-NZ" dirty="0"/>
-              <a:t>StringBuilder</a:t>
-            </a:r>
-          </a:p>
-        </p:txBody>
-      </p:sp>
-      <p:pic>
-        <p:nvPicPr>
-          <p:cNvPr id="5" name="Content Placeholder 4">
-            <a:extLst>
-              <a:ext uri="{FF2B5EF4-FFF2-40B4-BE49-F238E27FC236}">
-                <a16:creationId xmlns:a16="http://schemas.microsoft.com/office/drawing/2014/main" id="{86CCABAC-00A5-E483-4746-CE7A345E77F3}"/>
-              </a:ext>
-            </a:extLst>
-          </p:cNvPr>
-          <p:cNvPicPr>
-            <a:picLocks noGrp="1" noChangeAspect="1"/>
-          </p:cNvPicPr>
+              <a:t>Record classes</a:t>
+            </a:r>
+          </a:p>
+        </p:txBody>
+      </p:sp>
+      <p:sp>
+        <p:nvSpPr>
+          <p:cNvPr id="3" name="Content Placeholder 2">
+            <a:extLst>
+              <a:ext uri="{FF2B5EF4-FFF2-40B4-BE49-F238E27FC236}">
+                <a16:creationId xmlns:a16="http://schemas.microsoft.com/office/drawing/2014/main" id="{24470875-FC58-806A-E27B-055AFC9C7DAF}"/>
+              </a:ext>
+            </a:extLst>
+          </p:cNvPr>
+          <p:cNvSpPr>
+            <a:spLocks noGrp="1"/>
+          </p:cNvSpPr>
           <p:nvPr>
             <p:ph idx="1"/>
           </p:nvPr>
-        </p:nvPicPr>
-        <p:blipFill>
-          <a:blip r:embed="rId2"/>
-          <a:stretch>
-            <a:fillRect/>
-          </a:stretch>
-        </p:blipFill>
-        <p:spPr>
-          <a:xfrm>
-            <a:off x="4400313" y="3186793"/>
-            <a:ext cx="3391373" cy="1629002"/>
-          </a:xfrm>
-        </p:spPr>
-      </p:pic>
-      <p:pic>
-        <p:nvPicPr>
-          <p:cNvPr id="7" name="Picture 6">
-            <a:extLst>
-              <a:ext uri="{FF2B5EF4-FFF2-40B4-BE49-F238E27FC236}">
-                <a16:creationId xmlns:a16="http://schemas.microsoft.com/office/drawing/2014/main" id="{38EE440F-0E52-AF01-36C2-2FBD4032D172}"/>
-              </a:ext>
-            </a:extLst>
-          </p:cNvPr>
-          <p:cNvPicPr>
-            <a:picLocks noChangeAspect="1"/>
-          </p:cNvPicPr>
-          <p:nvPr/>
-        </p:nvPicPr>
-        <p:blipFill>
-          <a:blip r:embed="rId3"/>
-          <a:stretch>
-            <a:fillRect/>
-          </a:stretch>
-        </p:blipFill>
-        <p:spPr>
-          <a:xfrm>
-            <a:off x="5055998" y="4815795"/>
-            <a:ext cx="1781424" cy="562053"/>
-          </a:xfrm>
-          <a:prstGeom prst="rect">
-            <a:avLst/>
-          </a:prstGeom>
-        </p:spPr>
-      </p:pic>
+        </p:nvSpPr>
+        <p:spPr/>
+        <p:txBody>
+          <a:bodyPr/>
+          <a:lstStyle/>
+          <a:p>
+            <a:endParaRPr lang="en-NZ"/>
+          </a:p>
+        </p:txBody>
+      </p:sp>
     </p:spTree>
     <p:extLst>
       <p:ext uri="{BB962C8B-B14F-4D97-AF65-F5344CB8AC3E}">
-        <p14:creationId xmlns:p14="http://schemas.microsoft.com/office/powerpoint/2010/main" val="2353741229"/>
+        <p14:creationId xmlns:p14="http://schemas.microsoft.com/office/powerpoint/2010/main" val="1234308769"/>
       </p:ext>
     </p:extLst>
   </p:cSld>
@@ -5041,7 +5163,7 @@
           <p:cNvPr id="2" name="Title 1">
             <a:extLst>
               <a:ext uri="{FF2B5EF4-FFF2-40B4-BE49-F238E27FC236}">
-                <a16:creationId xmlns:a16="http://schemas.microsoft.com/office/drawing/2014/main" id="{BAB69147-3B98-A99C-47B1-0B8D246F323C}"/>
+                <a16:creationId xmlns:a16="http://schemas.microsoft.com/office/drawing/2014/main" id="{463B862C-4E14-71FB-0400-E076839333B5}"/>
               </a:ext>
             </a:extLst>
           </p:cNvPr>
@@ -5059,7 +5181,7 @@
           <a:p>
             <a:r>
               <a:rPr lang="en-NZ" dirty="0"/>
-              <a:t>Switch expressions</a:t>
+              <a:t>var local type inference</a:t>
             </a:r>
           </a:p>
         </p:txBody>
@@ -5069,7 +5191,7 @@
           <p:cNvPr id="5" name="Content Placeholder 4">
             <a:extLst>
               <a:ext uri="{FF2B5EF4-FFF2-40B4-BE49-F238E27FC236}">
-                <a16:creationId xmlns:a16="http://schemas.microsoft.com/office/drawing/2014/main" id="{6229931E-8422-C26C-A654-30579CD0ECD6}"/>
+                <a16:creationId xmlns:a16="http://schemas.microsoft.com/office/drawing/2014/main" id="{99FFC6D5-AC65-A4E2-375A-AA71A93A24C6}"/>
               </a:ext>
             </a:extLst>
           </p:cNvPr>
@@ -5088,75 +5210,15 @@
         </p:blipFill>
         <p:spPr>
           <a:xfrm>
-            <a:off x="937288" y="1560005"/>
-            <a:ext cx="4887007" cy="2400635"/>
-          </a:xfrm>
-        </p:spPr>
-      </p:pic>
-      <p:pic>
-        <p:nvPicPr>
-          <p:cNvPr id="7" name="Picture 6">
-            <a:extLst>
-              <a:ext uri="{FF2B5EF4-FFF2-40B4-BE49-F238E27FC236}">
-                <a16:creationId xmlns:a16="http://schemas.microsoft.com/office/drawing/2014/main" id="{1042CEE6-6909-CB35-F114-3F274D5AA58B}"/>
-              </a:ext>
-            </a:extLst>
-          </p:cNvPr>
-          <p:cNvPicPr>
-            <a:picLocks noChangeAspect="1"/>
-          </p:cNvPicPr>
-          <p:nvPr/>
-        </p:nvPicPr>
-        <p:blipFill>
-          <a:blip r:embed="rId3"/>
-          <a:stretch>
-            <a:fillRect/>
-          </a:stretch>
-        </p:blipFill>
-        <p:spPr>
-          <a:xfrm>
-            <a:off x="5923383" y="2760322"/>
-            <a:ext cx="4105848" cy="1276528"/>
-          </a:xfrm>
-          <a:prstGeom prst="rect">
-            <a:avLst/>
-          </a:prstGeom>
-        </p:spPr>
-      </p:pic>
-      <p:pic>
-        <p:nvPicPr>
-          <p:cNvPr id="9" name="Picture 8">
-            <a:extLst>
-              <a:ext uri="{FF2B5EF4-FFF2-40B4-BE49-F238E27FC236}">
-                <a16:creationId xmlns:a16="http://schemas.microsoft.com/office/drawing/2014/main" id="{3BEC2169-0337-25E4-A366-0AD83EEDBD69}"/>
-              </a:ext>
-            </a:extLst>
-          </p:cNvPr>
-          <p:cNvPicPr>
-            <a:picLocks noChangeAspect="1"/>
-          </p:cNvPicPr>
-          <p:nvPr/>
-        </p:nvPicPr>
-        <p:blipFill>
-          <a:blip r:embed="rId4"/>
-          <a:stretch>
-            <a:fillRect/>
-          </a:stretch>
-        </p:blipFill>
-        <p:spPr>
-          <a:xfrm>
-            <a:off x="5923383" y="1560005"/>
-            <a:ext cx="3096057" cy="1114581"/>
-          </a:xfrm>
-          <a:prstGeom prst="rect">
-            <a:avLst/>
-          </a:prstGeom>
+            <a:off x="4100234" y="3667872"/>
+            <a:ext cx="3991532" cy="666843"/>
+          </a:xfrm>
         </p:spPr>
       </p:pic>
     </p:spTree>
     <p:extLst>
       <p:ext uri="{BB962C8B-B14F-4D97-AF65-F5344CB8AC3E}">
-        <p14:creationId xmlns:p14="http://schemas.microsoft.com/office/powerpoint/2010/main" val="3221706584"/>
+        <p14:creationId xmlns:p14="http://schemas.microsoft.com/office/powerpoint/2010/main" val="2845120372"/>
       </p:ext>
     </p:extLst>
   </p:cSld>
@@ -5188,7 +5250,7 @@
           <p:cNvPr id="2" name="Title 1">
             <a:extLst>
               <a:ext uri="{FF2B5EF4-FFF2-40B4-BE49-F238E27FC236}">
-                <a16:creationId xmlns:a16="http://schemas.microsoft.com/office/drawing/2014/main" id="{3D82688E-51D6-F3B4-2D85-7C0B0E039703}"/>
+                <a16:creationId xmlns:a16="http://schemas.microsoft.com/office/drawing/2014/main" id="{48358EF9-F7C4-A589-3629-9A5701508B68}"/>
               </a:ext>
             </a:extLst>
           </p:cNvPr>
@@ -5206,40 +5268,74 @@
           <a:p>
             <a:r>
               <a:rPr lang="en-NZ" dirty="0"/>
-              <a:t>Record classes</a:t>
-            </a:r>
-          </a:p>
-        </p:txBody>
-      </p:sp>
-      <p:sp>
-        <p:nvSpPr>
-          <p:cNvPr id="3" name="Content Placeholder 2">
-            <a:extLst>
-              <a:ext uri="{FF2B5EF4-FFF2-40B4-BE49-F238E27FC236}">
-                <a16:creationId xmlns:a16="http://schemas.microsoft.com/office/drawing/2014/main" id="{24470875-FC58-806A-E27B-055AFC9C7DAF}"/>
-              </a:ext>
-            </a:extLst>
-          </p:cNvPr>
-          <p:cNvSpPr>
-            <a:spLocks noGrp="1"/>
-          </p:cNvSpPr>
+              <a:t>Sealed classes</a:t>
+            </a:r>
+          </a:p>
+        </p:txBody>
+      </p:sp>
+      <p:pic>
+        <p:nvPicPr>
+          <p:cNvPr id="5" name="Content Placeholder 4">
+            <a:extLst>
+              <a:ext uri="{FF2B5EF4-FFF2-40B4-BE49-F238E27FC236}">
+                <a16:creationId xmlns:a16="http://schemas.microsoft.com/office/drawing/2014/main" id="{B2DDC520-009A-883E-222C-33256B7B76CF}"/>
+              </a:ext>
+            </a:extLst>
+          </p:cNvPr>
+          <p:cNvPicPr>
+            <a:picLocks noGrp="1" noChangeAspect="1"/>
+          </p:cNvPicPr>
           <p:nvPr>
             <p:ph idx="1"/>
           </p:nvPr>
-        </p:nvSpPr>
-        <p:spPr/>
-        <p:txBody>
-          <a:bodyPr/>
-          <a:lstStyle/>
-          <a:p>
-            <a:endParaRPr lang="en-NZ"/>
-          </a:p>
-        </p:txBody>
-      </p:sp>
+        </p:nvPicPr>
+        <p:blipFill>
+          <a:blip r:embed="rId2"/>
+          <a:stretch>
+            <a:fillRect/>
+          </a:stretch>
+        </p:blipFill>
+        <p:spPr>
+          <a:xfrm>
+            <a:off x="3295259" y="1842661"/>
+            <a:ext cx="5601482" cy="771633"/>
+          </a:xfrm>
+        </p:spPr>
+      </p:pic>
+      <p:pic>
+        <p:nvPicPr>
+          <p:cNvPr id="7" name="Picture 6">
+            <a:extLst>
+              <a:ext uri="{FF2B5EF4-FFF2-40B4-BE49-F238E27FC236}">
+                <a16:creationId xmlns:a16="http://schemas.microsoft.com/office/drawing/2014/main" id="{BA5C0E6B-2B9C-DC14-687B-B6C9591D7419}"/>
+              </a:ext>
+            </a:extLst>
+          </p:cNvPr>
+          <p:cNvPicPr>
+            <a:picLocks noChangeAspect="1"/>
+          </p:cNvPicPr>
+          <p:nvPr/>
+        </p:nvPicPr>
+        <p:blipFill>
+          <a:blip r:embed="rId3"/>
+          <a:stretch>
+            <a:fillRect/>
+          </a:stretch>
+        </p:blipFill>
+        <p:spPr>
+          <a:xfrm>
+            <a:off x="4100234" y="3083838"/>
+            <a:ext cx="3991532" cy="3172268"/>
+          </a:xfrm>
+          <a:prstGeom prst="rect">
+            <a:avLst/>
+          </a:prstGeom>
+        </p:spPr>
+      </p:pic>
     </p:spTree>
     <p:extLst>
       <p:ext uri="{BB962C8B-B14F-4D97-AF65-F5344CB8AC3E}">
-        <p14:creationId xmlns:p14="http://schemas.microsoft.com/office/powerpoint/2010/main" val="1234308769"/>
+        <p14:creationId xmlns:p14="http://schemas.microsoft.com/office/powerpoint/2010/main" val="1082376882"/>
       </p:ext>
     </p:extLst>
   </p:cSld>
@@ -5271,7 +5367,7 @@
           <p:cNvPr id="2" name="Title 1">
             <a:extLst>
               <a:ext uri="{FF2B5EF4-FFF2-40B4-BE49-F238E27FC236}">
-                <a16:creationId xmlns:a16="http://schemas.microsoft.com/office/drawing/2014/main" id="{463B862C-4E14-71FB-0400-E076839333B5}"/>
+                <a16:creationId xmlns:a16="http://schemas.microsoft.com/office/drawing/2014/main" id="{F6CC33BD-A8A9-BB6C-4A61-397DB2DEC425}"/>
               </a:ext>
             </a:extLst>
           </p:cNvPr>
@@ -5289,40 +5385,44 @@
           <a:p>
             <a:r>
               <a:rPr lang="en-NZ" dirty="0"/>
-              <a:t>var local type inference</a:t>
-            </a:r>
-          </a:p>
-        </p:txBody>
-      </p:sp>
-      <p:sp>
-        <p:nvSpPr>
-          <p:cNvPr id="3" name="Content Placeholder 2">
-            <a:extLst>
-              <a:ext uri="{FF2B5EF4-FFF2-40B4-BE49-F238E27FC236}">
-                <a16:creationId xmlns:a16="http://schemas.microsoft.com/office/drawing/2014/main" id="{B743D697-83A7-91EB-EE29-D05AF76A9E11}"/>
-              </a:ext>
-            </a:extLst>
-          </p:cNvPr>
-          <p:cNvSpPr>
-            <a:spLocks noGrp="1"/>
-          </p:cNvSpPr>
+              <a:t>Text Blocks</a:t>
+            </a:r>
+          </a:p>
+        </p:txBody>
+      </p:sp>
+      <p:pic>
+        <p:nvPicPr>
+          <p:cNvPr id="5" name="Content Placeholder 4">
+            <a:extLst>
+              <a:ext uri="{FF2B5EF4-FFF2-40B4-BE49-F238E27FC236}">
+                <a16:creationId xmlns:a16="http://schemas.microsoft.com/office/drawing/2014/main" id="{2E168683-4CF0-189D-AF6D-CBFA02F28EC3}"/>
+              </a:ext>
+            </a:extLst>
+          </p:cNvPr>
+          <p:cNvPicPr>
+            <a:picLocks noGrp="1" noChangeAspect="1"/>
+          </p:cNvPicPr>
           <p:nvPr>
             <p:ph idx="1"/>
           </p:nvPr>
-        </p:nvSpPr>
-        <p:spPr/>
-        <p:txBody>
-          <a:bodyPr/>
-          <a:lstStyle/>
-          <a:p>
-            <a:endParaRPr lang="en-NZ"/>
-          </a:p>
-        </p:txBody>
-      </p:sp>
+        </p:nvPicPr>
+        <p:blipFill>
+          <a:blip r:embed="rId2"/>
+          <a:stretch>
+            <a:fillRect/>
+          </a:stretch>
+        </p:blipFill>
+        <p:spPr>
+          <a:xfrm>
+            <a:off x="3114259" y="2519950"/>
+            <a:ext cx="5963482" cy="2962688"/>
+          </a:xfrm>
+        </p:spPr>
+      </p:pic>
     </p:spTree>
     <p:extLst>
       <p:ext uri="{BB962C8B-B14F-4D97-AF65-F5344CB8AC3E}">
-        <p14:creationId xmlns:p14="http://schemas.microsoft.com/office/powerpoint/2010/main" val="2845120372"/>
+        <p14:creationId xmlns:p14="http://schemas.microsoft.com/office/powerpoint/2010/main" val="1252464097"/>
       </p:ext>
     </p:extLst>
   </p:cSld>
@@ -5354,172 +5454,6 @@
           <p:cNvPr id="2" name="Title 1">
             <a:extLst>
               <a:ext uri="{FF2B5EF4-FFF2-40B4-BE49-F238E27FC236}">
-                <a16:creationId xmlns:a16="http://schemas.microsoft.com/office/drawing/2014/main" id="{48358EF9-F7C4-A589-3629-9A5701508B68}"/>
-              </a:ext>
-            </a:extLst>
-          </p:cNvPr>
-          <p:cNvSpPr>
-            <a:spLocks noGrp="1"/>
-          </p:cNvSpPr>
-          <p:nvPr>
-            <p:ph type="title"/>
-          </p:nvPr>
-        </p:nvSpPr>
-        <p:spPr/>
-        <p:txBody>
-          <a:bodyPr/>
-          <a:lstStyle/>
-          <a:p>
-            <a:r>
-              <a:rPr lang="en-NZ" dirty="0"/>
-              <a:t>Sealed classes</a:t>
-            </a:r>
-          </a:p>
-        </p:txBody>
-      </p:sp>
-      <p:sp>
-        <p:nvSpPr>
-          <p:cNvPr id="3" name="Content Placeholder 2">
-            <a:extLst>
-              <a:ext uri="{FF2B5EF4-FFF2-40B4-BE49-F238E27FC236}">
-                <a16:creationId xmlns:a16="http://schemas.microsoft.com/office/drawing/2014/main" id="{37E7A296-C14B-450A-CB03-4E0357B0CC39}"/>
-              </a:ext>
-            </a:extLst>
-          </p:cNvPr>
-          <p:cNvSpPr>
-            <a:spLocks noGrp="1"/>
-          </p:cNvSpPr>
-          <p:nvPr>
-            <p:ph idx="1"/>
-          </p:nvPr>
-        </p:nvSpPr>
-        <p:spPr/>
-        <p:txBody>
-          <a:bodyPr/>
-          <a:lstStyle/>
-          <a:p>
-            <a:endParaRPr lang="en-NZ"/>
-          </a:p>
-        </p:txBody>
-      </p:sp>
-    </p:spTree>
-    <p:extLst>
-      <p:ext uri="{BB962C8B-B14F-4D97-AF65-F5344CB8AC3E}">
-        <p14:creationId xmlns:p14="http://schemas.microsoft.com/office/powerpoint/2010/main" val="1082376882"/>
-      </p:ext>
-    </p:extLst>
-  </p:cSld>
-  <p:clrMapOvr>
-    <a:masterClrMapping/>
-  </p:clrMapOvr>
-</p:sld>
-</file>
-
-<file path=ppt/slides/slide28.xml><?xml version="1.0" encoding="utf-8"?>
-<p:sld xmlns:a="http://schemas.openxmlformats.org/drawingml/2006/main" xmlns:r="http://schemas.openxmlformats.org/officeDocument/2006/relationships" xmlns:p="http://schemas.openxmlformats.org/presentationml/2006/main">
-  <p:cSld>
-    <p:spTree>
-      <p:nvGrpSpPr>
-        <p:cNvPr id="1" name=""/>
-        <p:cNvGrpSpPr/>
-        <p:nvPr/>
-      </p:nvGrpSpPr>
-      <p:grpSpPr>
-        <a:xfrm>
-          <a:off x="0" y="0"/>
-          <a:ext cx="0" cy="0"/>
-          <a:chOff x="0" y="0"/>
-          <a:chExt cx="0" cy="0"/>
-        </a:xfrm>
-      </p:grpSpPr>
-      <p:sp>
-        <p:nvSpPr>
-          <p:cNvPr id="2" name="Title 1">
-            <a:extLst>
-              <a:ext uri="{FF2B5EF4-FFF2-40B4-BE49-F238E27FC236}">
-                <a16:creationId xmlns:a16="http://schemas.microsoft.com/office/drawing/2014/main" id="{F6CC33BD-A8A9-BB6C-4A61-397DB2DEC425}"/>
-              </a:ext>
-            </a:extLst>
-          </p:cNvPr>
-          <p:cNvSpPr>
-            <a:spLocks noGrp="1"/>
-          </p:cNvSpPr>
-          <p:nvPr>
-            <p:ph type="title"/>
-          </p:nvPr>
-        </p:nvSpPr>
-        <p:spPr/>
-        <p:txBody>
-          <a:bodyPr/>
-          <a:lstStyle/>
-          <a:p>
-            <a:r>
-              <a:rPr lang="en-NZ" dirty="0"/>
-              <a:t>Text Blocks</a:t>
-            </a:r>
-          </a:p>
-        </p:txBody>
-      </p:sp>
-      <p:sp>
-        <p:nvSpPr>
-          <p:cNvPr id="3" name="Content Placeholder 2">
-            <a:extLst>
-              <a:ext uri="{FF2B5EF4-FFF2-40B4-BE49-F238E27FC236}">
-                <a16:creationId xmlns:a16="http://schemas.microsoft.com/office/drawing/2014/main" id="{59C64303-DDA9-43A0-8DCF-88DF8FE8404B}"/>
-              </a:ext>
-            </a:extLst>
-          </p:cNvPr>
-          <p:cNvSpPr>
-            <a:spLocks noGrp="1"/>
-          </p:cNvSpPr>
-          <p:nvPr>
-            <p:ph idx="1"/>
-          </p:nvPr>
-        </p:nvSpPr>
-        <p:spPr/>
-        <p:txBody>
-          <a:bodyPr/>
-          <a:lstStyle/>
-          <a:p>
-            <a:endParaRPr lang="en-NZ"/>
-          </a:p>
-        </p:txBody>
-      </p:sp>
-    </p:spTree>
-    <p:extLst>
-      <p:ext uri="{BB962C8B-B14F-4D97-AF65-F5344CB8AC3E}">
-        <p14:creationId xmlns:p14="http://schemas.microsoft.com/office/powerpoint/2010/main" val="1252464097"/>
-      </p:ext>
-    </p:extLst>
-  </p:cSld>
-  <p:clrMapOvr>
-    <a:masterClrMapping/>
-  </p:clrMapOvr>
-</p:sld>
-</file>
-
-<file path=ppt/slides/slide29.xml><?xml version="1.0" encoding="utf-8"?>
-<p:sld xmlns:a="http://schemas.openxmlformats.org/drawingml/2006/main" xmlns:r="http://schemas.openxmlformats.org/officeDocument/2006/relationships" xmlns:p="http://schemas.openxmlformats.org/presentationml/2006/main">
-  <p:cSld>
-    <p:spTree>
-      <p:nvGrpSpPr>
-        <p:cNvPr id="1" name=""/>
-        <p:cNvGrpSpPr/>
-        <p:nvPr/>
-      </p:nvGrpSpPr>
-      <p:grpSpPr>
-        <a:xfrm>
-          <a:off x="0" y="0"/>
-          <a:ext cx="0" cy="0"/>
-          <a:chOff x="0" y="0"/>
-          <a:chExt cx="0" cy="0"/>
-        </a:xfrm>
-      </p:grpSpPr>
-      <p:sp>
-        <p:nvSpPr>
-          <p:cNvPr id="2" name="Title 1">
-            <a:extLst>
-              <a:ext uri="{FF2B5EF4-FFF2-40B4-BE49-F238E27FC236}">
                 <a16:creationId xmlns:a16="http://schemas.microsoft.com/office/drawing/2014/main" id="{45C8CE41-2E6B-E2F9-6158-B0A331654914}"/>
               </a:ext>
             </a:extLst>
@@ -5543,31 +5477,35 @@
           </a:p>
         </p:txBody>
       </p:sp>
-      <p:sp>
-        <p:nvSpPr>
-          <p:cNvPr id="3" name="Content Placeholder 2">
-            <a:extLst>
-              <a:ext uri="{FF2B5EF4-FFF2-40B4-BE49-F238E27FC236}">
-                <a16:creationId xmlns:a16="http://schemas.microsoft.com/office/drawing/2014/main" id="{F8D49E66-0D08-08C9-90AE-2C7A4A02EE0E}"/>
-              </a:ext>
-            </a:extLst>
-          </p:cNvPr>
-          <p:cNvSpPr>
-            <a:spLocks noGrp="1"/>
-          </p:cNvSpPr>
+      <p:pic>
+        <p:nvPicPr>
+          <p:cNvPr id="5" name="Content Placeholder 4">
+            <a:extLst>
+              <a:ext uri="{FF2B5EF4-FFF2-40B4-BE49-F238E27FC236}">
+                <a16:creationId xmlns:a16="http://schemas.microsoft.com/office/drawing/2014/main" id="{4798B927-5497-8A10-EB8E-690D82D4CB8C}"/>
+              </a:ext>
+            </a:extLst>
+          </p:cNvPr>
+          <p:cNvPicPr>
+            <a:picLocks noGrp="1" noChangeAspect="1"/>
+          </p:cNvPicPr>
           <p:nvPr>
             <p:ph idx="1"/>
           </p:nvPr>
-        </p:nvSpPr>
-        <p:spPr/>
-        <p:txBody>
-          <a:bodyPr/>
-          <a:lstStyle/>
-          <a:p>
-            <a:endParaRPr lang="en-NZ"/>
-          </a:p>
-        </p:txBody>
-      </p:sp>
+        </p:nvPicPr>
+        <p:blipFill>
+          <a:blip r:embed="rId2"/>
+          <a:stretch>
+            <a:fillRect/>
+          </a:stretch>
+        </p:blipFill>
+        <p:spPr>
+          <a:xfrm>
+            <a:off x="3804918" y="2924819"/>
+            <a:ext cx="4582164" cy="2152950"/>
+          </a:xfrm>
+        </p:spPr>
+      </p:pic>
     </p:spTree>
     <p:extLst>
       <p:ext uri="{BB962C8B-B14F-4D97-AF65-F5344CB8AC3E}">
@@ -5603,7 +5541,7 @@
           <p:cNvPr id="2" name="Title 1">
             <a:extLst>
               <a:ext uri="{FF2B5EF4-FFF2-40B4-BE49-F238E27FC236}">
-                <a16:creationId xmlns:a16="http://schemas.microsoft.com/office/drawing/2014/main" id="{34D4E5CB-F967-2E9B-CD40-794566174A01}"/>
+                <a16:creationId xmlns:a16="http://schemas.microsoft.com/office/drawing/2014/main" id="{3822D337-36D5-3C05-5876-3D98C35F0160}"/>
               </a:ext>
             </a:extLst>
           </p:cNvPr>
@@ -5621,100 +5559,44 @@
           <a:p>
             <a:r>
               <a:rPr lang="en-NZ" dirty="0"/>
-              <a:t>10/26</a:t>
-            </a:r>
-          </a:p>
-        </p:txBody>
-      </p:sp>
-      <p:sp>
-        <p:nvSpPr>
-          <p:cNvPr id="3" name="Content Placeholder 2">
-            <a:extLst>
-              <a:ext uri="{FF2B5EF4-FFF2-40B4-BE49-F238E27FC236}">
-                <a16:creationId xmlns:a16="http://schemas.microsoft.com/office/drawing/2014/main" id="{F27E1C1E-EE00-4A36-9A5F-BE33E267BBEE}"/>
-              </a:ext>
-            </a:extLst>
-          </p:cNvPr>
-          <p:cNvSpPr>
-            <a:spLocks noGrp="1"/>
-          </p:cNvSpPr>
+              <a:t>Arrays</a:t>
+            </a:r>
+          </a:p>
+        </p:txBody>
+      </p:sp>
+      <p:pic>
+        <p:nvPicPr>
+          <p:cNvPr id="5" name="Content Placeholder 4">
+            <a:extLst>
+              <a:ext uri="{FF2B5EF4-FFF2-40B4-BE49-F238E27FC236}">
+                <a16:creationId xmlns:a16="http://schemas.microsoft.com/office/drawing/2014/main" id="{3BB72977-A5EB-5AF1-4907-2AE8034B41DB}"/>
+              </a:ext>
+            </a:extLst>
+          </p:cNvPr>
+          <p:cNvPicPr>
+            <a:picLocks noGrp="1" noChangeAspect="1"/>
+          </p:cNvPicPr>
           <p:nvPr>
             <p:ph idx="1"/>
           </p:nvPr>
-        </p:nvSpPr>
-        <p:spPr/>
-        <p:txBody>
-          <a:bodyPr>
-            <a:normAutofit fontScale="92500" lnSpcReduction="20000"/>
-          </a:bodyPr>
-          <a:lstStyle/>
-          <a:p>
-            <a:r>
-              <a:rPr lang="en-US" dirty="0"/>
-              <a:t>Primitive Data Types </a:t>
-            </a:r>
-          </a:p>
-          <a:p>
-            <a:r>
-              <a:rPr lang="en-US" dirty="0"/>
-              <a:t>Arrays </a:t>
-            </a:r>
-          </a:p>
-          <a:p>
-            <a:r>
-              <a:rPr lang="en-US" dirty="0"/>
-              <a:t>Control flow statements </a:t>
-            </a:r>
-          </a:p>
-          <a:p>
-            <a:r>
-              <a:rPr lang="en-US" dirty="0"/>
-              <a:t>Classes </a:t>
-            </a:r>
-          </a:p>
-          <a:p>
-            <a:r>
-              <a:rPr lang="en-US" dirty="0"/>
-              <a:t>Passing Information to a Method or a Constructor and returning values </a:t>
-            </a:r>
-          </a:p>
-          <a:p>
-            <a:r>
-              <a:rPr lang="en-US" dirty="0"/>
-              <a:t>Controlling Access to Members of a Class</a:t>
-            </a:r>
-          </a:p>
-          <a:p>
-            <a:r>
-              <a:rPr lang="en-US" dirty="0"/>
-              <a:t>Static and final </a:t>
-            </a:r>
-          </a:p>
-          <a:p>
-            <a:r>
-              <a:rPr lang="en-US" dirty="0"/>
-              <a:t>Lambda Expressions </a:t>
-            </a:r>
-          </a:p>
-          <a:p>
-            <a:r>
-              <a:rPr lang="en-US" dirty="0"/>
-              <a:t>9 Method references </a:t>
-            </a:r>
-          </a:p>
-          <a:p>
-            <a:r>
-              <a:rPr lang="en-US" dirty="0"/>
-              <a:t>List</a:t>
-            </a:r>
-            <a:endParaRPr lang="en-NZ" dirty="0"/>
-          </a:p>
-        </p:txBody>
-      </p:sp>
+        </p:nvPicPr>
+        <p:blipFill>
+          <a:blip r:embed="rId2"/>
+          <a:stretch>
+            <a:fillRect/>
+          </a:stretch>
+        </p:blipFill>
+        <p:spPr>
+          <a:xfrm>
+            <a:off x="838200" y="1690688"/>
+            <a:ext cx="5496692" cy="2953162"/>
+          </a:xfrm>
+        </p:spPr>
+      </p:pic>
     </p:spTree>
     <p:extLst>
       <p:ext uri="{BB962C8B-B14F-4D97-AF65-F5344CB8AC3E}">
-        <p14:creationId xmlns:p14="http://schemas.microsoft.com/office/powerpoint/2010/main" val="24972855"/>
+        <p14:creationId xmlns:p14="http://schemas.microsoft.com/office/powerpoint/2010/main" val="2047448751"/>
       </p:ext>
     </p:extLst>
   </p:cSld>
@@ -5746,7 +5628,7 @@
           <p:cNvPr id="2" name="Title 1">
             <a:extLst>
               <a:ext uri="{FF2B5EF4-FFF2-40B4-BE49-F238E27FC236}">
-                <a16:creationId xmlns:a16="http://schemas.microsoft.com/office/drawing/2014/main" id="{C07D79E9-AE88-2FEB-A180-F9D5206A4EE3}"/>
+                <a16:creationId xmlns:a16="http://schemas.microsoft.com/office/drawing/2014/main" id="{1EF6F238-0B62-2609-22F3-B0CCDE32BAE6}"/>
               </a:ext>
             </a:extLst>
           </p:cNvPr>
@@ -5763,9 +5645,10 @@
           <a:lstStyle/>
           <a:p>
             <a:r>
-              <a:rPr lang="en-NZ" dirty="0"/>
-              <a:t>Primitive Data Types</a:t>
-            </a:r>
+              <a:rPr lang="en-US" dirty="0"/>
+              <a:t>Control flow statements </a:t>
+            </a:r>
+            <a:endParaRPr lang="en-NZ" dirty="0"/>
           </a:p>
         </p:txBody>
       </p:sp>
@@ -5774,7 +5657,7 @@
           <p:cNvPr id="5" name="Content Placeholder 4">
             <a:extLst>
               <a:ext uri="{FF2B5EF4-FFF2-40B4-BE49-F238E27FC236}">
-                <a16:creationId xmlns:a16="http://schemas.microsoft.com/office/drawing/2014/main" id="{1FB56D65-1057-3DCB-93D9-BE50E8E9072A}"/>
+                <a16:creationId xmlns:a16="http://schemas.microsoft.com/office/drawing/2014/main" id="{79696062-5EA2-6E84-5D8D-3937BE5043A1}"/>
               </a:ext>
             </a:extLst>
           </p:cNvPr>
@@ -5793,15 +5676,15 @@
         </p:blipFill>
         <p:spPr>
           <a:xfrm>
-            <a:off x="4676577" y="3310635"/>
-            <a:ext cx="2838846" cy="1381318"/>
+            <a:off x="838200" y="1578031"/>
+            <a:ext cx="4010585" cy="2229161"/>
           </a:xfrm>
         </p:spPr>
       </p:pic>
     </p:spTree>
     <p:extLst>
       <p:ext uri="{BB962C8B-B14F-4D97-AF65-F5344CB8AC3E}">
-        <p14:creationId xmlns:p14="http://schemas.microsoft.com/office/powerpoint/2010/main" val="725639315"/>
+        <p14:creationId xmlns:p14="http://schemas.microsoft.com/office/powerpoint/2010/main" val="1707186704"/>
       </p:ext>
     </p:extLst>
   </p:cSld>
@@ -5833,7 +5716,7 @@
           <p:cNvPr id="2" name="Title 1">
             <a:extLst>
               <a:ext uri="{FF2B5EF4-FFF2-40B4-BE49-F238E27FC236}">
-                <a16:creationId xmlns:a16="http://schemas.microsoft.com/office/drawing/2014/main" id="{3822D337-36D5-3C05-5876-3D98C35F0160}"/>
+                <a16:creationId xmlns:a16="http://schemas.microsoft.com/office/drawing/2014/main" id="{BD4B5E0D-C27A-F066-345D-B87D4EAB9073}"/>
               </a:ext>
             </a:extLst>
           </p:cNvPr>
@@ -5851,7 +5734,7 @@
           <a:p>
             <a:r>
               <a:rPr lang="en-NZ" dirty="0"/>
-              <a:t>Arrays</a:t>
+              <a:t>Classes</a:t>
             </a:r>
           </a:p>
         </p:txBody>
@@ -5861,7 +5744,7 @@
           <p:cNvPr id="5" name="Content Placeholder 4">
             <a:extLst>
               <a:ext uri="{FF2B5EF4-FFF2-40B4-BE49-F238E27FC236}">
-                <a16:creationId xmlns:a16="http://schemas.microsoft.com/office/drawing/2014/main" id="{3BB72977-A5EB-5AF1-4907-2AE8034B41DB}"/>
+                <a16:creationId xmlns:a16="http://schemas.microsoft.com/office/drawing/2014/main" id="{33E6CBFD-8460-F78B-B411-A87FE18E287D}"/>
               </a:ext>
             </a:extLst>
           </p:cNvPr>
@@ -5880,15 +5763,75 @@
         </p:blipFill>
         <p:spPr>
           <a:xfrm>
-            <a:off x="838200" y="1690688"/>
-            <a:ext cx="5496692" cy="2953162"/>
-          </a:xfrm>
+            <a:off x="754225" y="1397719"/>
+            <a:ext cx="3681323" cy="2490914"/>
+          </a:xfrm>
+        </p:spPr>
+      </p:pic>
+      <p:pic>
+        <p:nvPicPr>
+          <p:cNvPr id="7" name="Picture 6">
+            <a:extLst>
+              <a:ext uri="{FF2B5EF4-FFF2-40B4-BE49-F238E27FC236}">
+                <a16:creationId xmlns:a16="http://schemas.microsoft.com/office/drawing/2014/main" id="{827B7C78-8119-C893-BD7D-577324CB98B8}"/>
+              </a:ext>
+            </a:extLst>
+          </p:cNvPr>
+          <p:cNvPicPr>
+            <a:picLocks noChangeAspect="1"/>
+          </p:cNvPicPr>
+          <p:nvPr/>
+        </p:nvPicPr>
+        <p:blipFill>
+          <a:blip r:embed="rId3"/>
+          <a:stretch>
+            <a:fillRect/>
+          </a:stretch>
+        </p:blipFill>
+        <p:spPr>
+          <a:xfrm>
+            <a:off x="754225" y="3888633"/>
+            <a:ext cx="6347051" cy="2842201"/>
+          </a:xfrm>
+          <a:prstGeom prst="rect">
+            <a:avLst/>
+          </a:prstGeom>
+        </p:spPr>
+      </p:pic>
+      <p:pic>
+        <p:nvPicPr>
+          <p:cNvPr id="9" name="Picture 8">
+            <a:extLst>
+              <a:ext uri="{FF2B5EF4-FFF2-40B4-BE49-F238E27FC236}">
+                <a16:creationId xmlns:a16="http://schemas.microsoft.com/office/drawing/2014/main" id="{678D2AE6-520C-24F8-DCDE-5CBB3FB3E894}"/>
+              </a:ext>
+            </a:extLst>
+          </p:cNvPr>
+          <p:cNvPicPr>
+            <a:picLocks noChangeAspect="1"/>
+          </p:cNvPicPr>
+          <p:nvPr/>
+        </p:nvPicPr>
+        <p:blipFill>
+          <a:blip r:embed="rId4"/>
+          <a:stretch>
+            <a:fillRect/>
+          </a:stretch>
+        </p:blipFill>
+        <p:spPr>
+          <a:xfrm>
+            <a:off x="4996362" y="1483929"/>
+            <a:ext cx="2591162" cy="1781424"/>
+          </a:xfrm>
+          <a:prstGeom prst="rect">
+            <a:avLst/>
+          </a:prstGeom>
         </p:spPr>
       </p:pic>
     </p:spTree>
     <p:extLst>
       <p:ext uri="{BB962C8B-B14F-4D97-AF65-F5344CB8AC3E}">
-        <p14:creationId xmlns:p14="http://schemas.microsoft.com/office/powerpoint/2010/main" val="2047448751"/>
+        <p14:creationId xmlns:p14="http://schemas.microsoft.com/office/powerpoint/2010/main" val="821992165"/>
       </p:ext>
     </p:extLst>
   </p:cSld>
@@ -5920,7 +5863,7 @@
           <p:cNvPr id="2" name="Title 1">
             <a:extLst>
               <a:ext uri="{FF2B5EF4-FFF2-40B4-BE49-F238E27FC236}">
-                <a16:creationId xmlns:a16="http://schemas.microsoft.com/office/drawing/2014/main" id="{1EF6F238-0B62-2609-22F3-B0CCDE32BAE6}"/>
+                <a16:creationId xmlns:a16="http://schemas.microsoft.com/office/drawing/2014/main" id="{95AC5B8A-671C-7333-63B1-01F71D4C9F91}"/>
               </a:ext>
             </a:extLst>
           </p:cNvPr>
@@ -5933,12 +5876,14 @@
         </p:nvSpPr>
         <p:spPr/>
         <p:txBody>
-          <a:bodyPr/>
+          <a:bodyPr>
+            <a:normAutofit/>
+          </a:bodyPr>
           <a:lstStyle/>
           <a:p>
             <a:r>
               <a:rPr lang="en-US" dirty="0"/>
-              <a:t>Control flow statements </a:t>
+              <a:t>Passing Information to a Method or a Constructor and returning values </a:t>
             </a:r>
             <a:endParaRPr lang="en-NZ" dirty="0"/>
           </a:p>
@@ -5946,10 +5891,10 @@
       </p:sp>
       <p:pic>
         <p:nvPicPr>
-          <p:cNvPr id="5" name="Content Placeholder 4">
-            <a:extLst>
-              <a:ext uri="{FF2B5EF4-FFF2-40B4-BE49-F238E27FC236}">
-                <a16:creationId xmlns:a16="http://schemas.microsoft.com/office/drawing/2014/main" id="{79696062-5EA2-6E84-5D8D-3937BE5043A1}"/>
+          <p:cNvPr id="9" name="Content Placeholder 8">
+            <a:extLst>
+              <a:ext uri="{FF2B5EF4-FFF2-40B4-BE49-F238E27FC236}">
+                <a16:creationId xmlns:a16="http://schemas.microsoft.com/office/drawing/2014/main" id="{A156003B-231D-D76F-8270-3B0563A2747F}"/>
               </a:ext>
             </a:extLst>
           </p:cNvPr>
@@ -5968,15 +5913,75 @@
         </p:blipFill>
         <p:spPr>
           <a:xfrm>
-            <a:off x="838200" y="1578031"/>
-            <a:ext cx="4010585" cy="2229161"/>
-          </a:xfrm>
+            <a:off x="838200" y="1690688"/>
+            <a:ext cx="5191850" cy="1743318"/>
+          </a:xfrm>
+        </p:spPr>
+      </p:pic>
+      <p:pic>
+        <p:nvPicPr>
+          <p:cNvPr id="11" name="Picture 10">
+            <a:extLst>
+              <a:ext uri="{FF2B5EF4-FFF2-40B4-BE49-F238E27FC236}">
+                <a16:creationId xmlns:a16="http://schemas.microsoft.com/office/drawing/2014/main" id="{DC1BD486-42C7-9F95-3689-128D7206A0D7}"/>
+              </a:ext>
+            </a:extLst>
+          </p:cNvPr>
+          <p:cNvPicPr>
+            <a:picLocks noChangeAspect="1"/>
+          </p:cNvPicPr>
+          <p:nvPr/>
+        </p:nvPicPr>
+        <p:blipFill>
+          <a:blip r:embed="rId3"/>
+          <a:stretch>
+            <a:fillRect/>
+          </a:stretch>
+        </p:blipFill>
+        <p:spPr>
+          <a:xfrm>
+            <a:off x="838200" y="3513043"/>
+            <a:ext cx="6239746" cy="1810003"/>
+          </a:xfrm>
+          <a:prstGeom prst="rect">
+            <a:avLst/>
+          </a:prstGeom>
+        </p:spPr>
+      </p:pic>
+      <p:pic>
+        <p:nvPicPr>
+          <p:cNvPr id="13" name="Picture 12">
+            <a:extLst>
+              <a:ext uri="{FF2B5EF4-FFF2-40B4-BE49-F238E27FC236}">
+                <a16:creationId xmlns:a16="http://schemas.microsoft.com/office/drawing/2014/main" id="{4DAE2CA5-95B0-7DB8-7C8D-C08FBB8AF38F}"/>
+              </a:ext>
+            </a:extLst>
+          </p:cNvPr>
+          <p:cNvPicPr>
+            <a:picLocks noChangeAspect="1"/>
+          </p:cNvPicPr>
+          <p:nvPr/>
+        </p:nvPicPr>
+        <p:blipFill>
+          <a:blip r:embed="rId4"/>
+          <a:stretch>
+            <a:fillRect/>
+          </a:stretch>
+        </p:blipFill>
+        <p:spPr>
+          <a:xfrm>
+            <a:off x="6767481" y="1769725"/>
+            <a:ext cx="1848108" cy="971686"/>
+          </a:xfrm>
+          <a:prstGeom prst="rect">
+            <a:avLst/>
+          </a:prstGeom>
         </p:spPr>
       </p:pic>
     </p:spTree>
     <p:extLst>
       <p:ext uri="{BB962C8B-B14F-4D97-AF65-F5344CB8AC3E}">
-        <p14:creationId xmlns:p14="http://schemas.microsoft.com/office/powerpoint/2010/main" val="1707186704"/>
+        <p14:creationId xmlns:p14="http://schemas.microsoft.com/office/powerpoint/2010/main" val="3673181818"/>
       </p:ext>
     </p:extLst>
   </p:cSld>
@@ -6008,7 +6013,7 @@
           <p:cNvPr id="2" name="Title 1">
             <a:extLst>
               <a:ext uri="{FF2B5EF4-FFF2-40B4-BE49-F238E27FC236}">
-                <a16:creationId xmlns:a16="http://schemas.microsoft.com/office/drawing/2014/main" id="{BD4B5E0D-C27A-F066-345D-B87D4EAB9073}"/>
+                <a16:creationId xmlns:a16="http://schemas.microsoft.com/office/drawing/2014/main" id="{3D86AD9A-2D3D-3C88-7F72-D7B3F51E7A1A}"/>
               </a:ext>
             </a:extLst>
           </p:cNvPr>
@@ -6026,7 +6031,7 @@
           <a:p>
             <a:r>
               <a:rPr lang="en-NZ" dirty="0"/>
-              <a:t>Classes</a:t>
+              <a:t>Controlling Access Members of a Class</a:t>
             </a:r>
           </a:p>
         </p:txBody>
@@ -6036,7 +6041,7 @@
           <p:cNvPr id="5" name="Content Placeholder 4">
             <a:extLst>
               <a:ext uri="{FF2B5EF4-FFF2-40B4-BE49-F238E27FC236}">
-                <a16:creationId xmlns:a16="http://schemas.microsoft.com/office/drawing/2014/main" id="{33E6CBFD-8460-F78B-B411-A87FE18E287D}"/>
+                <a16:creationId xmlns:a16="http://schemas.microsoft.com/office/drawing/2014/main" id="{420E83BE-EE9A-17EA-B100-D52AB1315F82}"/>
               </a:ext>
             </a:extLst>
           </p:cNvPr>
@@ -6055,8 +6060,8 @@
         </p:blipFill>
         <p:spPr>
           <a:xfrm>
-            <a:off x="754225" y="1397719"/>
-            <a:ext cx="3681323" cy="2490914"/>
+            <a:off x="614565" y="1690688"/>
+            <a:ext cx="4058216" cy="2953162"/>
           </a:xfrm>
         </p:spPr>
       </p:pic>
@@ -6065,7 +6070,7 @@
           <p:cNvPr id="7" name="Picture 6">
             <a:extLst>
               <a:ext uri="{FF2B5EF4-FFF2-40B4-BE49-F238E27FC236}">
-                <a16:creationId xmlns:a16="http://schemas.microsoft.com/office/drawing/2014/main" id="{827B7C78-8119-C893-BD7D-577324CB98B8}"/>
+                <a16:creationId xmlns:a16="http://schemas.microsoft.com/office/drawing/2014/main" id="{37BE7545-859B-7FFD-0902-D85A95EAA7E0}"/>
               </a:ext>
             </a:extLst>
           </p:cNvPr>
@@ -6082,38 +6087,8 @@
         </p:blipFill>
         <p:spPr>
           <a:xfrm>
-            <a:off x="754225" y="3888633"/>
-            <a:ext cx="6347051" cy="2842201"/>
-          </a:xfrm>
-          <a:prstGeom prst="rect">
-            <a:avLst/>
-          </a:prstGeom>
-        </p:spPr>
-      </p:pic>
-      <p:pic>
-        <p:nvPicPr>
-          <p:cNvPr id="9" name="Picture 8">
-            <a:extLst>
-              <a:ext uri="{FF2B5EF4-FFF2-40B4-BE49-F238E27FC236}">
-                <a16:creationId xmlns:a16="http://schemas.microsoft.com/office/drawing/2014/main" id="{678D2AE6-520C-24F8-DCDE-5CBB3FB3E894}"/>
-              </a:ext>
-            </a:extLst>
-          </p:cNvPr>
-          <p:cNvPicPr>
-            <a:picLocks noChangeAspect="1"/>
-          </p:cNvPicPr>
-          <p:nvPr/>
-        </p:nvPicPr>
-        <p:blipFill>
-          <a:blip r:embed="rId4"/>
-          <a:stretch>
-            <a:fillRect/>
-          </a:stretch>
-        </p:blipFill>
-        <p:spPr>
-          <a:xfrm>
-            <a:off x="4996362" y="1483929"/>
-            <a:ext cx="2591162" cy="1781424"/>
+            <a:off x="614565" y="4833890"/>
+            <a:ext cx="5801535" cy="666843"/>
           </a:xfrm>
           <a:prstGeom prst="rect">
             <a:avLst/>
@@ -6123,7 +6098,7 @@
     </p:spTree>
     <p:extLst>
       <p:ext uri="{BB962C8B-B14F-4D97-AF65-F5344CB8AC3E}">
-        <p14:creationId xmlns:p14="http://schemas.microsoft.com/office/powerpoint/2010/main" val="821992165"/>
+        <p14:creationId xmlns:p14="http://schemas.microsoft.com/office/powerpoint/2010/main" val="3943566747"/>
       </p:ext>
     </p:extLst>
   </p:cSld>
@@ -6155,7 +6130,7 @@
           <p:cNvPr id="2" name="Title 1">
             <a:extLst>
               <a:ext uri="{FF2B5EF4-FFF2-40B4-BE49-F238E27FC236}">
-                <a16:creationId xmlns:a16="http://schemas.microsoft.com/office/drawing/2014/main" id="{95AC5B8A-671C-7333-63B1-01F71D4C9F91}"/>
+                <a16:creationId xmlns:a16="http://schemas.microsoft.com/office/drawing/2014/main" id="{F107DB49-2574-39C9-693D-C8EDBAED35AA}"/>
               </a:ext>
             </a:extLst>
           </p:cNvPr>
@@ -6168,25 +6143,22 @@
         </p:nvSpPr>
         <p:spPr/>
         <p:txBody>
-          <a:bodyPr>
-            <a:normAutofit/>
-          </a:bodyPr>
-          <a:lstStyle/>
-          <a:p>
-            <a:r>
-              <a:rPr lang="en-US" dirty="0"/>
-              <a:t>Passing Information to a Method or a Constructor and returning values </a:t>
-            </a:r>
-            <a:endParaRPr lang="en-NZ" dirty="0"/>
+          <a:bodyPr/>
+          <a:lstStyle/>
+          <a:p>
+            <a:r>
+              <a:rPr lang="en-NZ" dirty="0"/>
+              <a:t>Static and Final</a:t>
+            </a:r>
           </a:p>
         </p:txBody>
       </p:sp>
       <p:pic>
         <p:nvPicPr>
-          <p:cNvPr id="9" name="Content Placeholder 8">
-            <a:extLst>
-              <a:ext uri="{FF2B5EF4-FFF2-40B4-BE49-F238E27FC236}">
-                <a16:creationId xmlns:a16="http://schemas.microsoft.com/office/drawing/2014/main" id="{A156003B-231D-D76F-8270-3B0563A2747F}"/>
+          <p:cNvPr id="5" name="Content Placeholder 4">
+            <a:extLst>
+              <a:ext uri="{FF2B5EF4-FFF2-40B4-BE49-F238E27FC236}">
+                <a16:creationId xmlns:a16="http://schemas.microsoft.com/office/drawing/2014/main" id="{D33696F0-1921-2B53-8860-C183B1D15C20}"/>
               </a:ext>
             </a:extLst>
           </p:cNvPr>
@@ -6205,75 +6177,15 @@
         </p:blipFill>
         <p:spPr>
           <a:xfrm>
-            <a:off x="838200" y="1690688"/>
-            <a:ext cx="5191850" cy="1743318"/>
-          </a:xfrm>
-        </p:spPr>
-      </p:pic>
-      <p:pic>
-        <p:nvPicPr>
-          <p:cNvPr id="11" name="Picture 10">
-            <a:extLst>
-              <a:ext uri="{FF2B5EF4-FFF2-40B4-BE49-F238E27FC236}">
-                <a16:creationId xmlns:a16="http://schemas.microsoft.com/office/drawing/2014/main" id="{DC1BD486-42C7-9F95-3689-128D7206A0D7}"/>
-              </a:ext>
-            </a:extLst>
-          </p:cNvPr>
-          <p:cNvPicPr>
-            <a:picLocks noChangeAspect="1"/>
-          </p:cNvPicPr>
-          <p:nvPr/>
-        </p:nvPicPr>
-        <p:blipFill>
-          <a:blip r:embed="rId3"/>
-          <a:stretch>
-            <a:fillRect/>
-          </a:stretch>
-        </p:blipFill>
-        <p:spPr>
-          <a:xfrm>
-            <a:off x="838200" y="3513043"/>
-            <a:ext cx="6239746" cy="1810003"/>
-          </a:xfrm>
-          <a:prstGeom prst="rect">
-            <a:avLst/>
-          </a:prstGeom>
-        </p:spPr>
-      </p:pic>
-      <p:pic>
-        <p:nvPicPr>
-          <p:cNvPr id="13" name="Picture 12">
-            <a:extLst>
-              <a:ext uri="{FF2B5EF4-FFF2-40B4-BE49-F238E27FC236}">
-                <a16:creationId xmlns:a16="http://schemas.microsoft.com/office/drawing/2014/main" id="{4DAE2CA5-95B0-7DB8-7C8D-C08FBB8AF38F}"/>
-              </a:ext>
-            </a:extLst>
-          </p:cNvPr>
-          <p:cNvPicPr>
-            <a:picLocks noChangeAspect="1"/>
-          </p:cNvPicPr>
-          <p:nvPr/>
-        </p:nvPicPr>
-        <p:blipFill>
-          <a:blip r:embed="rId4"/>
-          <a:stretch>
-            <a:fillRect/>
-          </a:stretch>
-        </p:blipFill>
-        <p:spPr>
-          <a:xfrm>
-            <a:off x="6767481" y="1769725"/>
-            <a:ext cx="1848108" cy="971686"/>
-          </a:xfrm>
-          <a:prstGeom prst="rect">
-            <a:avLst/>
-          </a:prstGeom>
+            <a:off x="3298518" y="2231545"/>
+            <a:ext cx="3467584" cy="609685"/>
+          </a:xfrm>
         </p:spPr>
       </p:pic>
     </p:spTree>
     <p:extLst>
       <p:ext uri="{BB962C8B-B14F-4D97-AF65-F5344CB8AC3E}">
-        <p14:creationId xmlns:p14="http://schemas.microsoft.com/office/powerpoint/2010/main" val="3673181818"/>
+        <p14:creationId xmlns:p14="http://schemas.microsoft.com/office/powerpoint/2010/main" val="3477456064"/>
       </p:ext>
     </p:extLst>
   </p:cSld>
@@ -6305,7 +6217,7 @@
           <p:cNvPr id="2" name="Title 1">
             <a:extLst>
               <a:ext uri="{FF2B5EF4-FFF2-40B4-BE49-F238E27FC236}">
-                <a16:creationId xmlns:a16="http://schemas.microsoft.com/office/drawing/2014/main" id="{3D86AD9A-2D3D-3C88-7F72-D7B3F51E7A1A}"/>
+                <a16:creationId xmlns:a16="http://schemas.microsoft.com/office/drawing/2014/main" id="{DA4D7F7E-2844-6686-FA66-9D071D061FA3}"/>
               </a:ext>
             </a:extLst>
           </p:cNvPr>
@@ -6323,7 +6235,7 @@
           <a:p>
             <a:r>
               <a:rPr lang="en-NZ" dirty="0"/>
-              <a:t>Controlling Access Members of a Class</a:t>
+              <a:t>Lambda Expression</a:t>
             </a:r>
           </a:p>
         </p:txBody>
@@ -6333,7 +6245,7 @@
           <p:cNvPr id="5" name="Content Placeholder 4">
             <a:extLst>
               <a:ext uri="{FF2B5EF4-FFF2-40B4-BE49-F238E27FC236}">
-                <a16:creationId xmlns:a16="http://schemas.microsoft.com/office/drawing/2014/main" id="{420E83BE-EE9A-17EA-B100-D52AB1315F82}"/>
+                <a16:creationId xmlns:a16="http://schemas.microsoft.com/office/drawing/2014/main" id="{01A45979-BCC1-D262-E6A3-668DC800443F}"/>
               </a:ext>
             </a:extLst>
           </p:cNvPr>
@@ -6352,8 +6264,8 @@
         </p:blipFill>
         <p:spPr>
           <a:xfrm>
-            <a:off x="614565" y="1690688"/>
-            <a:ext cx="4058216" cy="2953162"/>
+            <a:off x="1031834" y="1784720"/>
+            <a:ext cx="5220429" cy="962159"/>
           </a:xfrm>
         </p:spPr>
       </p:pic>
@@ -6362,7 +6274,7 @@
           <p:cNvPr id="7" name="Picture 6">
             <a:extLst>
               <a:ext uri="{FF2B5EF4-FFF2-40B4-BE49-F238E27FC236}">
-                <a16:creationId xmlns:a16="http://schemas.microsoft.com/office/drawing/2014/main" id="{37BE7545-859B-7FFD-0902-D85A95EAA7E0}"/>
+                <a16:creationId xmlns:a16="http://schemas.microsoft.com/office/drawing/2014/main" id="{C62F3210-0C09-213E-1A8F-A5138D96B77D}"/>
               </a:ext>
             </a:extLst>
           </p:cNvPr>
@@ -6379,8 +6291,8 @@
         </p:blipFill>
         <p:spPr>
           <a:xfrm>
-            <a:off x="614565" y="4833890"/>
-            <a:ext cx="5801535" cy="666843"/>
+            <a:off x="5133840" y="3252763"/>
+            <a:ext cx="1924319" cy="352474"/>
           </a:xfrm>
           <a:prstGeom prst="rect">
             <a:avLst/>
@@ -6390,7 +6302,7 @@
     </p:spTree>
     <p:extLst>
       <p:ext uri="{BB962C8B-B14F-4D97-AF65-F5344CB8AC3E}">
-        <p14:creationId xmlns:p14="http://schemas.microsoft.com/office/powerpoint/2010/main" val="3943566747"/>
+        <p14:creationId xmlns:p14="http://schemas.microsoft.com/office/powerpoint/2010/main" val="4046120223"/>
       </p:ext>
     </p:extLst>
   </p:cSld>

</xml_diff>